<commit_message>
Added Plotting and Subplotting functions
</commit_message>
<xml_diff>
--- a/Day 2 of Crash Course/University of Illinois REU Introduction to Matlab Day 2 with examples.pptx
+++ b/Day 2 of Crash Course/University of Illinois REU Introduction to Matlab Day 2 with examples.pptx
@@ -7,12 +7,16 @@
   <p:sldIdLst>
     <p:sldId id="256" r:id="rId2"/>
     <p:sldId id="257" r:id="rId3"/>
-    <p:sldId id="258" r:id="rId4"/>
+    <p:sldId id="264" r:id="rId4"/>
     <p:sldId id="260" r:id="rId5"/>
     <p:sldId id="263" r:id="rId6"/>
-    <p:sldId id="261" r:id="rId7"/>
-    <p:sldId id="262" r:id="rId8"/>
-    <p:sldId id="259" r:id="rId9"/>
+    <p:sldId id="265" r:id="rId7"/>
+    <p:sldId id="266" r:id="rId8"/>
+    <p:sldId id="267" r:id="rId9"/>
+    <p:sldId id="268" r:id="rId10"/>
+    <p:sldId id="261" r:id="rId11"/>
+    <p:sldId id="262" r:id="rId12"/>
+    <p:sldId id="259" r:id="rId13"/>
   </p:sldIdLst>
   <p:sldSz cx="12192000" cy="6858000"/>
   <p:notesSz cx="6858000" cy="9144000"/>
@@ -248,7 +252,7 @@
           <a:p>
             <a:fld id="{4F813D5D-9D8E-4484-BE86-4458FD589FAD}" type="datetimeFigureOut">
               <a:rPr lang="en-US" smtClean="0"/>
-              <a:t>5/31/2017</a:t>
+              <a:t>6/30/2017</a:t>
             </a:fld>
             <a:endParaRPr lang="en-US"/>
           </a:p>
@@ -416,7 +420,7 @@
           <a:p>
             <a:fld id="{4F813D5D-9D8E-4484-BE86-4458FD589FAD}" type="datetimeFigureOut">
               <a:rPr lang="en-US" smtClean="0"/>
-              <a:t>5/31/2017</a:t>
+              <a:t>6/30/2017</a:t>
             </a:fld>
             <a:endParaRPr lang="en-US"/>
           </a:p>
@@ -594,7 +598,7 @@
           <a:p>
             <a:fld id="{4F813D5D-9D8E-4484-BE86-4458FD589FAD}" type="datetimeFigureOut">
               <a:rPr lang="en-US" smtClean="0"/>
-              <a:t>5/31/2017</a:t>
+              <a:t>6/30/2017</a:t>
             </a:fld>
             <a:endParaRPr lang="en-US"/>
           </a:p>
@@ -762,7 +766,7 @@
           <a:p>
             <a:fld id="{4F813D5D-9D8E-4484-BE86-4458FD589FAD}" type="datetimeFigureOut">
               <a:rPr lang="en-US" smtClean="0"/>
-              <a:t>5/31/2017</a:t>
+              <a:t>6/30/2017</a:t>
             </a:fld>
             <a:endParaRPr lang="en-US"/>
           </a:p>
@@ -1007,7 +1011,7 @@
           <a:p>
             <a:fld id="{4F813D5D-9D8E-4484-BE86-4458FD589FAD}" type="datetimeFigureOut">
               <a:rPr lang="en-US" smtClean="0"/>
-              <a:t>5/31/2017</a:t>
+              <a:t>6/30/2017</a:t>
             </a:fld>
             <a:endParaRPr lang="en-US"/>
           </a:p>
@@ -1236,7 +1240,7 @@
           <a:p>
             <a:fld id="{4F813D5D-9D8E-4484-BE86-4458FD589FAD}" type="datetimeFigureOut">
               <a:rPr lang="en-US" smtClean="0"/>
-              <a:t>5/31/2017</a:t>
+              <a:t>6/30/2017</a:t>
             </a:fld>
             <a:endParaRPr lang="en-US"/>
           </a:p>
@@ -1600,7 +1604,7 @@
           <a:p>
             <a:fld id="{4F813D5D-9D8E-4484-BE86-4458FD589FAD}" type="datetimeFigureOut">
               <a:rPr lang="en-US" smtClean="0"/>
-              <a:t>5/31/2017</a:t>
+              <a:t>6/30/2017</a:t>
             </a:fld>
             <a:endParaRPr lang="en-US"/>
           </a:p>
@@ -1717,7 +1721,7 @@
           <a:p>
             <a:fld id="{4F813D5D-9D8E-4484-BE86-4458FD589FAD}" type="datetimeFigureOut">
               <a:rPr lang="en-US" smtClean="0"/>
-              <a:t>5/31/2017</a:t>
+              <a:t>6/30/2017</a:t>
             </a:fld>
             <a:endParaRPr lang="en-US"/>
           </a:p>
@@ -1812,7 +1816,7 @@
           <a:p>
             <a:fld id="{4F813D5D-9D8E-4484-BE86-4458FD589FAD}" type="datetimeFigureOut">
               <a:rPr lang="en-US" smtClean="0"/>
-              <a:t>5/31/2017</a:t>
+              <a:t>6/30/2017</a:t>
             </a:fld>
             <a:endParaRPr lang="en-US"/>
           </a:p>
@@ -2087,7 +2091,7 @@
           <a:p>
             <a:fld id="{4F813D5D-9D8E-4484-BE86-4458FD589FAD}" type="datetimeFigureOut">
               <a:rPr lang="en-US" smtClean="0"/>
-              <a:t>5/31/2017</a:t>
+              <a:t>6/30/2017</a:t>
             </a:fld>
             <a:endParaRPr lang="en-US"/>
           </a:p>
@@ -2342,7 +2346,7 @@
           <a:p>
             <a:fld id="{4F813D5D-9D8E-4484-BE86-4458FD589FAD}" type="datetimeFigureOut">
               <a:rPr lang="en-US" smtClean="0"/>
-              <a:t>5/31/2017</a:t>
+              <a:t>6/30/2017</a:t>
             </a:fld>
             <a:endParaRPr lang="en-US"/>
           </a:p>
@@ -2589,7 +2593,7 @@
           <a:p>
             <a:fld id="{4F813D5D-9D8E-4484-BE86-4458FD589FAD}" type="datetimeFigureOut">
               <a:rPr lang="en-US" smtClean="0"/>
-              <a:t>5/31/2017</a:t>
+              <a:t>6/30/2017</a:t>
             </a:fld>
             <a:endParaRPr lang="en-US"/>
           </a:p>
@@ -3071,6 +3075,843 @@
 </p:sld>
 </file>
 
+<file path=ppt/slides/slide10.xml><?xml version="1.0" encoding="utf-8"?>
+<p:sld xmlns:a="http://schemas.openxmlformats.org/drawingml/2006/main" xmlns:r="http://schemas.openxmlformats.org/officeDocument/2006/relationships" xmlns:p="http://schemas.openxmlformats.org/presentationml/2006/main">
+  <p:cSld>
+    <p:spTree>
+      <p:nvGrpSpPr>
+        <p:cNvPr id="1" name=""/>
+        <p:cNvGrpSpPr/>
+        <p:nvPr/>
+      </p:nvGrpSpPr>
+      <p:grpSpPr>
+        <a:xfrm>
+          <a:off x="0" y="0"/>
+          <a:ext cx="0" cy="0"/>
+          <a:chOff x="0" y="0"/>
+          <a:chExt cx="0" cy="0"/>
+        </a:xfrm>
+      </p:grpSpPr>
+      <p:sp>
+        <p:nvSpPr>
+          <p:cNvPr id="2" name="Title 1"/>
+          <p:cNvSpPr>
+            <a:spLocks noGrp="1"/>
+          </p:cNvSpPr>
+          <p:nvPr>
+            <p:ph type="title"/>
+          </p:nvPr>
+        </p:nvSpPr>
+        <p:spPr>
+          <a:xfrm>
+            <a:off x="89170" y="77787"/>
+            <a:ext cx="10515600" cy="1325563"/>
+          </a:xfrm>
+        </p:spPr>
+        <p:txBody>
+          <a:bodyPr/>
+          <a:lstStyle/>
+          <a:p>
+            <a:r>
+              <a:rPr lang="en-US" dirty="0"/>
+              <a:t>Fitting data to a Function</a:t>
+            </a:r>
+          </a:p>
+        </p:txBody>
+      </p:sp>
+      <p:sp>
+        <p:nvSpPr>
+          <p:cNvPr id="3" name="Content Placeholder 2"/>
+          <p:cNvSpPr>
+            <a:spLocks noGrp="1"/>
+          </p:cNvSpPr>
+          <p:nvPr>
+            <p:ph idx="1"/>
+          </p:nvPr>
+        </p:nvSpPr>
+        <p:spPr>
+          <a:xfrm>
+            <a:off x="169137" y="1190208"/>
+            <a:ext cx="8549640" cy="1732915"/>
+          </a:xfrm>
+        </p:spPr>
+        <p:txBody>
+          <a:bodyPr/>
+          <a:lstStyle/>
+          <a:p>
+            <a:pPr marL="0" indent="0">
+              <a:buNone/>
+            </a:pPr>
+            <a:r>
+              <a:rPr lang="en-US" dirty="0"/>
+              <a:t>Using Code</a:t>
+            </a:r>
+          </a:p>
+        </p:txBody>
+      </p:sp>
+      <p:sp>
+        <p:nvSpPr>
+          <p:cNvPr id="4" name="Rectangle 3"/>
+          <p:cNvSpPr/>
+          <p:nvPr/>
+        </p:nvSpPr>
+        <p:spPr>
+          <a:xfrm>
+            <a:off x="6608547" y="1022278"/>
+            <a:ext cx="4939219" cy="369332"/>
+          </a:xfrm>
+          <a:prstGeom prst="rect">
+            <a:avLst/>
+          </a:prstGeom>
+        </p:spPr>
+        <p:txBody>
+          <a:bodyPr wrap="square">
+            <a:spAutoFit/>
+          </a:bodyPr>
+          <a:lstStyle/>
+          <a:p>
+            <a:r>
+              <a:rPr lang="en-US" b="1" i="1" dirty="0"/>
+              <a:t>Try setting up a fit to the test data you generated</a:t>
+            </a:r>
+          </a:p>
+        </p:txBody>
+      </p:sp>
+      <p:pic>
+        <p:nvPicPr>
+          <p:cNvPr id="5" name="Picture 4"/>
+          <p:cNvPicPr>
+            <a:picLocks noChangeAspect="1"/>
+          </p:cNvPicPr>
+          <p:nvPr/>
+        </p:nvPicPr>
+        <p:blipFill rotWithShape="1">
+          <a:blip r:embed="rId2"/>
+          <a:srcRect r="45821"/>
+          <a:stretch/>
+        </p:blipFill>
+        <p:spPr>
+          <a:xfrm>
+            <a:off x="800976" y="4628852"/>
+            <a:ext cx="2802188" cy="1038225"/>
+          </a:xfrm>
+          <a:prstGeom prst="rect">
+            <a:avLst/>
+          </a:prstGeom>
+        </p:spPr>
+      </p:pic>
+      <p:cxnSp>
+        <p:nvCxnSpPr>
+          <p:cNvPr id="7" name="Straight Arrow Connector 6"/>
+          <p:cNvCxnSpPr/>
+          <p:nvPr/>
+        </p:nvCxnSpPr>
+        <p:spPr>
+          <a:xfrm>
+            <a:off x="2065072" y="4255581"/>
+            <a:ext cx="581217" cy="796884"/>
+          </a:xfrm>
+          <a:prstGeom prst="straightConnector1">
+            <a:avLst/>
+          </a:prstGeom>
+          <a:ln w="38100">
+            <a:solidFill>
+              <a:schemeClr val="tx1"/>
+            </a:solidFill>
+            <a:tailEnd type="triangle"/>
+          </a:ln>
+        </p:spPr>
+        <p:style>
+          <a:lnRef idx="1">
+            <a:schemeClr val="accent1"/>
+          </a:lnRef>
+          <a:fillRef idx="0">
+            <a:schemeClr val="accent1"/>
+          </a:fillRef>
+          <a:effectRef idx="0">
+            <a:schemeClr val="accent1"/>
+          </a:effectRef>
+          <a:fontRef idx="minor">
+            <a:schemeClr val="tx1"/>
+          </a:fontRef>
+        </p:style>
+      </p:cxnSp>
+      <p:pic>
+        <p:nvPicPr>
+          <p:cNvPr id="8" name="Picture 7"/>
+          <p:cNvPicPr>
+            <a:picLocks noChangeAspect="1"/>
+          </p:cNvPicPr>
+          <p:nvPr/>
+        </p:nvPicPr>
+        <p:blipFill>
+          <a:blip r:embed="rId3"/>
+          <a:stretch>
+            <a:fillRect/>
+          </a:stretch>
+        </p:blipFill>
+        <p:spPr>
+          <a:xfrm>
+            <a:off x="6856454" y="4190730"/>
+            <a:ext cx="3537316" cy="2383155"/>
+          </a:xfrm>
+          <a:prstGeom prst="rect">
+            <a:avLst/>
+          </a:prstGeom>
+        </p:spPr>
+      </p:pic>
+      <p:sp>
+        <p:nvSpPr>
+          <p:cNvPr id="9" name="TextBox 8"/>
+          <p:cNvSpPr txBox="1"/>
+          <p:nvPr/>
+        </p:nvSpPr>
+        <p:spPr>
+          <a:xfrm>
+            <a:off x="5050053" y="5914776"/>
+            <a:ext cx="1613943" cy="369332"/>
+          </a:xfrm>
+          <a:prstGeom prst="rect">
+            <a:avLst/>
+          </a:prstGeom>
+          <a:noFill/>
+        </p:spPr>
+        <p:txBody>
+          <a:bodyPr wrap="square" rtlCol="0">
+            <a:spAutoFit/>
+          </a:bodyPr>
+          <a:lstStyle/>
+          <a:p>
+            <a:r>
+              <a:rPr lang="en-US" dirty="0"/>
+              <a:t>Variables to fit</a:t>
+            </a:r>
+          </a:p>
+        </p:txBody>
+      </p:sp>
+      <p:cxnSp>
+        <p:nvCxnSpPr>
+          <p:cNvPr id="12" name="Straight Arrow Connector 11"/>
+          <p:cNvCxnSpPr/>
+          <p:nvPr/>
+        </p:nvCxnSpPr>
+        <p:spPr>
+          <a:xfrm flipV="1">
+            <a:off x="6089665" y="4741681"/>
+            <a:ext cx="1108481" cy="1037035"/>
+          </a:xfrm>
+          <a:prstGeom prst="straightConnector1">
+            <a:avLst/>
+          </a:prstGeom>
+          <a:ln w="38100">
+            <a:solidFill>
+              <a:schemeClr val="tx1"/>
+            </a:solidFill>
+            <a:tailEnd type="triangle"/>
+          </a:ln>
+        </p:spPr>
+        <p:style>
+          <a:lnRef idx="1">
+            <a:schemeClr val="accent1"/>
+          </a:lnRef>
+          <a:fillRef idx="0">
+            <a:schemeClr val="accent1"/>
+          </a:fillRef>
+          <a:effectRef idx="0">
+            <a:schemeClr val="accent1"/>
+          </a:effectRef>
+          <a:fontRef idx="minor">
+            <a:schemeClr val="tx1"/>
+          </a:fontRef>
+        </p:style>
+      </p:cxnSp>
+      <p:sp>
+        <p:nvSpPr>
+          <p:cNvPr id="13" name="TextBox 12"/>
+          <p:cNvSpPr txBox="1"/>
+          <p:nvPr/>
+        </p:nvSpPr>
+        <p:spPr>
+          <a:xfrm>
+            <a:off x="10875523" y="5594050"/>
+            <a:ext cx="891591" cy="369332"/>
+          </a:xfrm>
+          <a:prstGeom prst="rect">
+            <a:avLst/>
+          </a:prstGeom>
+          <a:noFill/>
+        </p:spPr>
+        <p:txBody>
+          <a:bodyPr wrap="none" rtlCol="0">
+            <a:spAutoFit/>
+          </a:bodyPr>
+          <a:lstStyle/>
+          <a:p>
+            <a:r>
+              <a:rPr lang="en-US" dirty="0"/>
+              <a:t>Fit type</a:t>
+            </a:r>
+          </a:p>
+        </p:txBody>
+      </p:sp>
+      <p:cxnSp>
+        <p:nvCxnSpPr>
+          <p:cNvPr id="15" name="Straight Arrow Connector 14"/>
+          <p:cNvCxnSpPr/>
+          <p:nvPr/>
+        </p:nvCxnSpPr>
+        <p:spPr>
+          <a:xfrm flipH="1" flipV="1">
+            <a:off x="9027268" y="4614214"/>
+            <a:ext cx="1848255" cy="1164502"/>
+          </a:xfrm>
+          <a:prstGeom prst="straightConnector1">
+            <a:avLst/>
+          </a:prstGeom>
+          <a:ln w="38100">
+            <a:solidFill>
+              <a:schemeClr val="tx1"/>
+            </a:solidFill>
+            <a:tailEnd type="triangle"/>
+          </a:ln>
+        </p:spPr>
+        <p:style>
+          <a:lnRef idx="1">
+            <a:schemeClr val="accent1"/>
+          </a:lnRef>
+          <a:fillRef idx="0">
+            <a:schemeClr val="accent1"/>
+          </a:fillRef>
+          <a:effectRef idx="0">
+            <a:schemeClr val="accent1"/>
+          </a:effectRef>
+          <a:fontRef idx="minor">
+            <a:schemeClr val="tx1"/>
+          </a:fontRef>
+        </p:style>
+      </p:cxnSp>
+      <p:sp>
+        <p:nvSpPr>
+          <p:cNvPr id="18" name="Content Placeholder 2"/>
+          <p:cNvSpPr txBox="1">
+            <a:spLocks/>
+          </p:cNvSpPr>
+          <p:nvPr/>
+        </p:nvSpPr>
+        <p:spPr>
+          <a:xfrm>
+            <a:off x="169137" y="3822112"/>
+            <a:ext cx="2401633" cy="426864"/>
+          </a:xfrm>
+          <a:prstGeom prst="rect">
+            <a:avLst/>
+          </a:prstGeom>
+        </p:spPr>
+        <p:txBody>
+          <a:bodyPr vert="horz" lIns="91440" tIns="45720" rIns="91440" bIns="45720" rtlCol="0">
+            <a:normAutofit fontScale="92500" lnSpcReduction="10000"/>
+          </a:bodyPr>
+          <a:lstStyle>
+            <a:lvl1pPr marL="228600" indent="-228600" algn="l" defTabSz="914400" rtl="0" eaLnBrk="1" latinLnBrk="0" hangingPunct="1">
+              <a:lnSpc>
+                <a:spcPct val="90000"/>
+              </a:lnSpc>
+              <a:spcBef>
+                <a:spcPts val="1000"/>
+              </a:spcBef>
+              <a:buFont typeface="Arial" panose="020B0604020202020204" pitchFamily="34" charset="0"/>
+              <a:buChar char="•"/>
+              <a:defRPr sz="2800" kern="1200">
+                <a:solidFill>
+                  <a:schemeClr val="tx1"/>
+                </a:solidFill>
+                <a:latin typeface="+mn-lt"/>
+                <a:ea typeface="+mn-ea"/>
+                <a:cs typeface="+mn-cs"/>
+              </a:defRPr>
+            </a:lvl1pPr>
+            <a:lvl2pPr marL="685800" indent="-228600" algn="l" defTabSz="914400" rtl="0" eaLnBrk="1" latinLnBrk="0" hangingPunct="1">
+              <a:lnSpc>
+                <a:spcPct val="90000"/>
+              </a:lnSpc>
+              <a:spcBef>
+                <a:spcPts val="500"/>
+              </a:spcBef>
+              <a:buFont typeface="Arial" panose="020B0604020202020204" pitchFamily="34" charset="0"/>
+              <a:buChar char="•"/>
+              <a:defRPr sz="2400" kern="1200">
+                <a:solidFill>
+                  <a:schemeClr val="tx1"/>
+                </a:solidFill>
+                <a:latin typeface="+mn-lt"/>
+                <a:ea typeface="+mn-ea"/>
+                <a:cs typeface="+mn-cs"/>
+              </a:defRPr>
+            </a:lvl2pPr>
+            <a:lvl3pPr marL="1143000" indent="-228600" algn="l" defTabSz="914400" rtl="0" eaLnBrk="1" latinLnBrk="0" hangingPunct="1">
+              <a:lnSpc>
+                <a:spcPct val="90000"/>
+              </a:lnSpc>
+              <a:spcBef>
+                <a:spcPts val="500"/>
+              </a:spcBef>
+              <a:buFont typeface="Arial" panose="020B0604020202020204" pitchFamily="34" charset="0"/>
+              <a:buChar char="•"/>
+              <a:defRPr sz="2000" kern="1200">
+                <a:solidFill>
+                  <a:schemeClr val="tx1"/>
+                </a:solidFill>
+                <a:latin typeface="+mn-lt"/>
+                <a:ea typeface="+mn-ea"/>
+                <a:cs typeface="+mn-cs"/>
+              </a:defRPr>
+            </a:lvl3pPr>
+            <a:lvl4pPr marL="1600200" indent="-228600" algn="l" defTabSz="914400" rtl="0" eaLnBrk="1" latinLnBrk="0" hangingPunct="1">
+              <a:lnSpc>
+                <a:spcPct val="90000"/>
+              </a:lnSpc>
+              <a:spcBef>
+                <a:spcPts val="500"/>
+              </a:spcBef>
+              <a:buFont typeface="Arial" panose="020B0604020202020204" pitchFamily="34" charset="0"/>
+              <a:buChar char="•"/>
+              <a:defRPr sz="1800" kern="1200">
+                <a:solidFill>
+                  <a:schemeClr val="tx1"/>
+                </a:solidFill>
+                <a:latin typeface="+mn-lt"/>
+                <a:ea typeface="+mn-ea"/>
+                <a:cs typeface="+mn-cs"/>
+              </a:defRPr>
+            </a:lvl4pPr>
+            <a:lvl5pPr marL="2057400" indent="-228600" algn="l" defTabSz="914400" rtl="0" eaLnBrk="1" latinLnBrk="0" hangingPunct="1">
+              <a:lnSpc>
+                <a:spcPct val="90000"/>
+              </a:lnSpc>
+              <a:spcBef>
+                <a:spcPts val="500"/>
+              </a:spcBef>
+              <a:buFont typeface="Arial" panose="020B0604020202020204" pitchFamily="34" charset="0"/>
+              <a:buChar char="•"/>
+              <a:defRPr sz="1800" kern="1200">
+                <a:solidFill>
+                  <a:schemeClr val="tx1"/>
+                </a:solidFill>
+                <a:latin typeface="+mn-lt"/>
+                <a:ea typeface="+mn-ea"/>
+                <a:cs typeface="+mn-cs"/>
+              </a:defRPr>
+            </a:lvl5pPr>
+            <a:lvl6pPr marL="2514600" indent="-228600" algn="l" defTabSz="914400" rtl="0" eaLnBrk="1" latinLnBrk="0" hangingPunct="1">
+              <a:lnSpc>
+                <a:spcPct val="90000"/>
+              </a:lnSpc>
+              <a:spcBef>
+                <a:spcPts val="500"/>
+              </a:spcBef>
+              <a:buFont typeface="Arial" panose="020B0604020202020204" pitchFamily="34" charset="0"/>
+              <a:buChar char="•"/>
+              <a:defRPr sz="1800" kern="1200">
+                <a:solidFill>
+                  <a:schemeClr val="tx1"/>
+                </a:solidFill>
+                <a:latin typeface="+mn-lt"/>
+                <a:ea typeface="+mn-ea"/>
+                <a:cs typeface="+mn-cs"/>
+              </a:defRPr>
+            </a:lvl6pPr>
+            <a:lvl7pPr marL="2971800" indent="-228600" algn="l" defTabSz="914400" rtl="0" eaLnBrk="1" latinLnBrk="0" hangingPunct="1">
+              <a:lnSpc>
+                <a:spcPct val="90000"/>
+              </a:lnSpc>
+              <a:spcBef>
+                <a:spcPts val="500"/>
+              </a:spcBef>
+              <a:buFont typeface="Arial" panose="020B0604020202020204" pitchFamily="34" charset="0"/>
+              <a:buChar char="•"/>
+              <a:defRPr sz="1800" kern="1200">
+                <a:solidFill>
+                  <a:schemeClr val="tx1"/>
+                </a:solidFill>
+                <a:latin typeface="+mn-lt"/>
+                <a:ea typeface="+mn-ea"/>
+                <a:cs typeface="+mn-cs"/>
+              </a:defRPr>
+            </a:lvl7pPr>
+            <a:lvl8pPr marL="3429000" indent="-228600" algn="l" defTabSz="914400" rtl="0" eaLnBrk="1" latinLnBrk="0" hangingPunct="1">
+              <a:lnSpc>
+                <a:spcPct val="90000"/>
+              </a:lnSpc>
+              <a:spcBef>
+                <a:spcPts val="500"/>
+              </a:spcBef>
+              <a:buFont typeface="Arial" panose="020B0604020202020204" pitchFamily="34" charset="0"/>
+              <a:buChar char="•"/>
+              <a:defRPr sz="1800" kern="1200">
+                <a:solidFill>
+                  <a:schemeClr val="tx1"/>
+                </a:solidFill>
+                <a:latin typeface="+mn-lt"/>
+                <a:ea typeface="+mn-ea"/>
+                <a:cs typeface="+mn-cs"/>
+              </a:defRPr>
+            </a:lvl8pPr>
+            <a:lvl9pPr marL="3886200" indent="-228600" algn="l" defTabSz="914400" rtl="0" eaLnBrk="1" latinLnBrk="0" hangingPunct="1">
+              <a:lnSpc>
+                <a:spcPct val="90000"/>
+              </a:lnSpc>
+              <a:spcBef>
+                <a:spcPts val="500"/>
+              </a:spcBef>
+              <a:buFont typeface="Arial" panose="020B0604020202020204" pitchFamily="34" charset="0"/>
+              <a:buChar char="•"/>
+              <a:defRPr sz="1800" kern="1200">
+                <a:solidFill>
+                  <a:schemeClr val="tx1"/>
+                </a:solidFill>
+                <a:latin typeface="+mn-lt"/>
+                <a:ea typeface="+mn-ea"/>
+                <a:cs typeface="+mn-cs"/>
+              </a:defRPr>
+            </a:lvl9pPr>
+          </a:lstStyle>
+          <a:p>
+            <a:pPr marL="0" indent="0">
+              <a:buFont typeface="Arial" panose="020B0604020202020204" pitchFamily="34" charset="0"/>
+              <a:buNone/>
+            </a:pPr>
+            <a:r>
+              <a:rPr lang="en-US" dirty="0"/>
+              <a:t>Using the GUI</a:t>
+            </a:r>
+          </a:p>
+        </p:txBody>
+      </p:sp>
+    </p:spTree>
+    <p:extLst>
+      <p:ext uri="{BB962C8B-B14F-4D97-AF65-F5344CB8AC3E}">
+        <p14:creationId xmlns:p14="http://schemas.microsoft.com/office/powerpoint/2010/main" val="1324146652"/>
+      </p:ext>
+    </p:extLst>
+  </p:cSld>
+  <p:clrMapOvr>
+    <a:masterClrMapping/>
+  </p:clrMapOvr>
+</p:sld>
+</file>
+
+<file path=ppt/slides/slide11.xml><?xml version="1.0" encoding="utf-8"?>
+<p:sld xmlns:a="http://schemas.openxmlformats.org/drawingml/2006/main" xmlns:r="http://schemas.openxmlformats.org/officeDocument/2006/relationships" xmlns:p="http://schemas.openxmlformats.org/presentationml/2006/main">
+  <p:cSld>
+    <p:spTree>
+      <p:nvGrpSpPr>
+        <p:cNvPr id="1" name=""/>
+        <p:cNvGrpSpPr/>
+        <p:nvPr/>
+      </p:nvGrpSpPr>
+      <p:grpSpPr>
+        <a:xfrm>
+          <a:off x="0" y="0"/>
+          <a:ext cx="0" cy="0"/>
+          <a:chOff x="0" y="0"/>
+          <a:chExt cx="0" cy="0"/>
+        </a:xfrm>
+      </p:grpSpPr>
+      <p:sp>
+        <p:nvSpPr>
+          <p:cNvPr id="2" name="Title 1"/>
+          <p:cNvSpPr>
+            <a:spLocks noGrp="1"/>
+          </p:cNvSpPr>
+          <p:nvPr>
+            <p:ph type="title"/>
+          </p:nvPr>
+        </p:nvSpPr>
+        <p:spPr/>
+        <p:txBody>
+          <a:bodyPr/>
+          <a:lstStyle/>
+          <a:p>
+            <a:r>
+              <a:rPr lang="en-US" dirty="0"/>
+              <a:t>Analyzing the Fit</a:t>
+            </a:r>
+          </a:p>
+        </p:txBody>
+      </p:sp>
+      <p:sp>
+        <p:nvSpPr>
+          <p:cNvPr id="3" name="Content Placeholder 2"/>
+          <p:cNvSpPr>
+            <a:spLocks noGrp="1"/>
+          </p:cNvSpPr>
+          <p:nvPr>
+            <p:ph idx="1"/>
+          </p:nvPr>
+        </p:nvSpPr>
+        <p:spPr/>
+        <p:txBody>
+          <a:bodyPr/>
+          <a:lstStyle/>
+          <a:p>
+            <a:r>
+              <a:rPr lang="en-US" dirty="0"/>
+              <a:t>The Fitting App gives a quality of fit</a:t>
+            </a:r>
+          </a:p>
+          <a:p>
+            <a:pPr marL="0" indent="0">
+              <a:buNone/>
+            </a:pPr>
+            <a:endParaRPr lang="en-US" dirty="0"/>
+          </a:p>
+        </p:txBody>
+      </p:sp>
+      <p:pic>
+        <p:nvPicPr>
+          <p:cNvPr id="4" name="Picture 3"/>
+          <p:cNvPicPr>
+            <a:picLocks noChangeAspect="1"/>
+          </p:cNvPicPr>
+          <p:nvPr/>
+        </p:nvPicPr>
+        <p:blipFill>
+          <a:blip r:embed="rId2"/>
+          <a:stretch>
+            <a:fillRect/>
+          </a:stretch>
+        </p:blipFill>
+        <p:spPr>
+          <a:xfrm>
+            <a:off x="6795135" y="2218214"/>
+            <a:ext cx="4654202" cy="3237706"/>
+          </a:xfrm>
+          <a:prstGeom prst="rect">
+            <a:avLst/>
+          </a:prstGeom>
+          <a:ln>
+            <a:solidFill>
+              <a:schemeClr val="tx1"/>
+            </a:solidFill>
+          </a:ln>
+        </p:spPr>
+      </p:pic>
+      <p:sp>
+        <p:nvSpPr>
+          <p:cNvPr id="5" name="Rectangle 4"/>
+          <p:cNvSpPr/>
+          <p:nvPr/>
+        </p:nvSpPr>
+        <p:spPr>
+          <a:xfrm>
+            <a:off x="546735" y="3923031"/>
+            <a:ext cx="6248400" cy="646331"/>
+          </a:xfrm>
+          <a:prstGeom prst="rect">
+            <a:avLst/>
+          </a:prstGeom>
+        </p:spPr>
+        <p:txBody>
+          <a:bodyPr wrap="square">
+            <a:spAutoFit/>
+          </a:bodyPr>
+          <a:lstStyle/>
+          <a:p>
+            <a:r>
+              <a:rPr lang="en-US" b="1" i="1" dirty="0"/>
+              <a:t>Try adding more and more random noise to your data and see what happens to the different goodness of fit parameters.</a:t>
+            </a:r>
+          </a:p>
+        </p:txBody>
+      </p:sp>
+    </p:spTree>
+    <p:extLst>
+      <p:ext uri="{BB962C8B-B14F-4D97-AF65-F5344CB8AC3E}">
+        <p14:creationId xmlns:p14="http://schemas.microsoft.com/office/powerpoint/2010/main" val="2121419604"/>
+      </p:ext>
+    </p:extLst>
+  </p:cSld>
+  <p:clrMapOvr>
+    <a:masterClrMapping/>
+  </p:clrMapOvr>
+</p:sld>
+</file>
+
+<file path=ppt/slides/slide12.xml><?xml version="1.0" encoding="utf-8"?>
+<p:sld xmlns:a="http://schemas.openxmlformats.org/drawingml/2006/main" xmlns:r="http://schemas.openxmlformats.org/officeDocument/2006/relationships" xmlns:p="http://schemas.openxmlformats.org/presentationml/2006/main">
+  <p:cSld>
+    <p:spTree>
+      <p:nvGrpSpPr>
+        <p:cNvPr id="1" name=""/>
+        <p:cNvGrpSpPr/>
+        <p:nvPr/>
+      </p:nvGrpSpPr>
+      <p:grpSpPr>
+        <a:xfrm>
+          <a:off x="0" y="0"/>
+          <a:ext cx="0" cy="0"/>
+          <a:chOff x="0" y="0"/>
+          <a:chExt cx="0" cy="0"/>
+        </a:xfrm>
+      </p:grpSpPr>
+      <p:sp>
+        <p:nvSpPr>
+          <p:cNvPr id="2" name="Title 1"/>
+          <p:cNvSpPr>
+            <a:spLocks noGrp="1"/>
+          </p:cNvSpPr>
+          <p:nvPr>
+            <p:ph type="title"/>
+          </p:nvPr>
+        </p:nvSpPr>
+        <p:spPr/>
+        <p:txBody>
+          <a:bodyPr/>
+          <a:lstStyle/>
+          <a:p>
+            <a:r>
+              <a:rPr lang="en-US" dirty="0"/>
+              <a:t>Importing Data</a:t>
+            </a:r>
+          </a:p>
+        </p:txBody>
+      </p:sp>
+      <p:sp>
+        <p:nvSpPr>
+          <p:cNvPr id="3" name="Content Placeholder 2"/>
+          <p:cNvSpPr>
+            <a:spLocks noGrp="1"/>
+          </p:cNvSpPr>
+          <p:nvPr>
+            <p:ph idx="1"/>
+          </p:nvPr>
+        </p:nvSpPr>
+        <p:spPr>
+          <a:xfrm>
+            <a:off x="838200" y="1848485"/>
+            <a:ext cx="10515600" cy="3104515"/>
+          </a:xfrm>
+        </p:spPr>
+        <p:txBody>
+          <a:bodyPr/>
+          <a:lstStyle/>
+          <a:p>
+            <a:pPr marL="0" indent="0">
+              <a:buNone/>
+            </a:pPr>
+            <a:r>
+              <a:rPr lang="en-US" dirty="0"/>
+              <a:t>Using Code – </a:t>
+            </a:r>
+            <a:r>
+              <a:rPr lang="en-US" dirty="0" err="1"/>
+              <a:t>Matlab</a:t>
+            </a:r>
+            <a:r>
+              <a:rPr lang="en-US" dirty="0"/>
+              <a:t> has support for importing a large variety of different file formats (</a:t>
+            </a:r>
+            <a:r>
+              <a:rPr lang="en-US" dirty="0">
+                <a:hlinkClick r:id="rId2"/>
+              </a:rPr>
+              <a:t>see her</a:t>
+            </a:r>
+            <a:r>
+              <a:rPr lang="en-US" dirty="0"/>
+              <a:t>e).  For today we will stick to using csv files (</a:t>
+            </a:r>
+            <a:r>
+              <a:rPr lang="en-US" dirty="0" err="1"/>
+              <a:t>csvread</a:t>
+            </a:r>
+            <a:r>
+              <a:rPr lang="en-US" dirty="0"/>
+              <a:t> and </a:t>
+            </a:r>
+            <a:r>
+              <a:rPr lang="en-US" dirty="0" err="1"/>
+              <a:t>csvwrite</a:t>
+            </a:r>
+            <a:r>
+              <a:rPr lang="en-US" dirty="0"/>
+              <a:t> commands).</a:t>
+            </a:r>
+          </a:p>
+          <a:p>
+            <a:pPr marL="0" indent="0">
+              <a:buNone/>
+            </a:pPr>
+            <a:endParaRPr lang="en-US" dirty="0"/>
+          </a:p>
+          <a:p>
+            <a:pPr marL="0" indent="0">
+              <a:buNone/>
+            </a:pPr>
+            <a:r>
+              <a:rPr lang="en-US" dirty="0"/>
+              <a:t>Like we did yesterday, if you have the data file downloaded you can drag and drop it into the workspace to import the data.  </a:t>
+            </a:r>
+          </a:p>
+        </p:txBody>
+      </p:sp>
+      <p:sp>
+        <p:nvSpPr>
+          <p:cNvPr id="4" name="Rectangle 3"/>
+          <p:cNvSpPr/>
+          <p:nvPr/>
+        </p:nvSpPr>
+        <p:spPr>
+          <a:xfrm>
+            <a:off x="2855595" y="4953000"/>
+            <a:ext cx="6248400" cy="1200329"/>
+          </a:xfrm>
+          <a:prstGeom prst="rect">
+            <a:avLst/>
+          </a:prstGeom>
+        </p:spPr>
+        <p:txBody>
+          <a:bodyPr wrap="square">
+            <a:spAutoFit/>
+          </a:bodyPr>
+          <a:lstStyle/>
+          <a:p>
+            <a:r>
+              <a:rPr lang="en-US" b="1" i="1" dirty="0"/>
+              <a:t>Try downloading the sample functions in the </a:t>
+            </a:r>
+            <a:r>
+              <a:rPr lang="en-US" b="1" i="1" dirty="0" err="1"/>
+              <a:t>Github</a:t>
+            </a:r>
+            <a:r>
+              <a:rPr lang="en-US" b="1" i="1" dirty="0"/>
+              <a:t> folder and figure out what the functions are.  If there is extra time, download the Boston marathon Data, and try fitting the outcomes to different functions (histograms to Gaussians </a:t>
+            </a:r>
+            <a:r>
+              <a:rPr lang="en-US" b="1" i="1" dirty="0" err="1"/>
+              <a:t>etc</a:t>
+            </a:r>
+            <a:r>
+              <a:rPr lang="en-US" b="1" i="1" dirty="0"/>
+              <a:t>)</a:t>
+            </a:r>
+          </a:p>
+        </p:txBody>
+      </p:sp>
+    </p:spTree>
+    <p:extLst>
+      <p:ext uri="{BB962C8B-B14F-4D97-AF65-F5344CB8AC3E}">
+        <p14:creationId xmlns:p14="http://schemas.microsoft.com/office/powerpoint/2010/main" val="1081705465"/>
+      </p:ext>
+    </p:extLst>
+  </p:cSld>
+  <p:clrMapOvr>
+    <a:masterClrMapping/>
+  </p:clrMapOvr>
+</p:sld>
+</file>
+
 <file path=ppt/slides/slide2.xml><?xml version="1.0" encoding="utf-8"?>
 <p:sld xmlns:a="http://schemas.openxmlformats.org/drawingml/2006/main" xmlns:r="http://schemas.openxmlformats.org/officeDocument/2006/relationships" xmlns:p="http://schemas.openxmlformats.org/presentationml/2006/main">
   <p:cSld>
@@ -3122,7 +3963,9 @@
         </p:nvSpPr>
         <p:spPr/>
         <p:txBody>
-          <a:bodyPr/>
+          <a:bodyPr>
+            <a:normAutofit lnSpcReduction="10000"/>
+          </a:bodyPr>
           <a:lstStyle/>
           <a:p>
             <a:pPr marL="0" indent="0">
@@ -3136,7 +3979,27 @@
           <a:p>
             <a:r>
               <a:rPr lang="en-US" dirty="0"/>
-              <a:t>Skills from Day One of the Crash Course</a:t>
+              <a:t>Familiarity using the </a:t>
+            </a:r>
+            <a:r>
+              <a:rPr lang="en-US" dirty="0" err="1"/>
+              <a:t>Matlab</a:t>
+            </a:r>
+            <a:r>
+              <a:rPr lang="en-US" dirty="0"/>
+              <a:t> interface</a:t>
+            </a:r>
+          </a:p>
+          <a:p>
+            <a:r>
+              <a:rPr lang="en-US" dirty="0"/>
+              <a:t>Be able to create variables, write and run .m files </a:t>
+            </a:r>
+          </a:p>
+          <a:p>
+            <a:r>
+              <a:rPr lang="en-US" dirty="0"/>
+              <a:t>Make graphs with code and the GUI</a:t>
             </a:r>
           </a:p>
           <a:p>
@@ -3257,73 +4120,46 @@
               <a:buNone/>
             </a:pPr>
             <a:r>
-              <a:rPr lang="en-US" u="sng" dirty="0" err="1"/>
-              <a:t>Matlab</a:t>
-            </a:r>
-            <a:r>
-              <a:rPr lang="en-US" u="sng" dirty="0"/>
-              <a:t> Documentation (online)</a:t>
-            </a:r>
-          </a:p>
-          <a:p>
-            <a:pPr lvl="1"/>
-            <a:r>
-              <a:rPr lang="en-US" dirty="0"/>
-              <a:t>Easiest to find through a Google search of “</a:t>
-            </a:r>
-            <a:r>
-              <a:rPr lang="en-US" dirty="0" err="1"/>
-              <a:t>Matlab</a:t>
-            </a:r>
-            <a:r>
-              <a:rPr lang="en-US" dirty="0"/>
-              <a:t> + command”</a:t>
-            </a:r>
-          </a:p>
-          <a:p>
-            <a:pPr lvl="1"/>
-            <a:r>
-              <a:rPr lang="en-US" dirty="0"/>
-              <a:t>There is example code with an explanation of most commands</a:t>
-            </a:r>
-          </a:p>
-          <a:p>
-            <a:pPr lvl="1"/>
-            <a:r>
-              <a:rPr lang="en-US" dirty="0"/>
-              <a:t>Links to similar commands are listed at the bottom of the page</a:t>
-            </a:r>
-          </a:p>
-          <a:p>
-            <a:pPr marL="0" indent="0">
-              <a:buNone/>
-            </a:pPr>
-            <a:r>
-              <a:rPr lang="en-US" u="sng" dirty="0">
-                <a:hlinkClick r:id="rId2"/>
-              </a:rPr>
-              <a:t>BYU Intro to </a:t>
-            </a:r>
-            <a:r>
               <a:rPr lang="en-US" u="sng" dirty="0" err="1">
                 <a:hlinkClick r:id="rId2"/>
               </a:rPr>
               <a:t>Matlab</a:t>
             </a:r>
+            <a:r>
+              <a:rPr lang="en-US" u="sng" dirty="0">
+                <a:hlinkClick r:id="rId2"/>
+              </a:rPr>
+              <a:t> Documentation</a:t>
+            </a:r>
             <a:endParaRPr lang="en-US" u="sng" dirty="0"/>
           </a:p>
           <a:p>
             <a:pPr lvl="1"/>
             <a:r>
               <a:rPr lang="en-US" dirty="0"/>
-              <a:t>Loosely used as an outline for this crash course</a:t>
+              <a:t>Easiest to find through a Google search of “</a:t>
+            </a:r>
+            <a:r>
+              <a:rPr lang="en-US" dirty="0" err="1"/>
+              <a:t>Matlab</a:t>
+            </a:r>
+            <a:r>
+              <a:rPr lang="en-US" dirty="0"/>
+              <a:t> + command”</a:t>
             </a:r>
           </a:p>
           <a:p>
             <a:pPr lvl="1"/>
             <a:r>
               <a:rPr lang="en-US" dirty="0"/>
-              <a:t>PDF with less explicit cross references than the online material</a:t>
+              <a:t>There is example code with an explanation of most commands</a:t>
+            </a:r>
+          </a:p>
+          <a:p>
+            <a:pPr lvl="1"/>
+            <a:r>
+              <a:rPr lang="en-US" dirty="0"/>
+              <a:t>Links to similar commands are listed at the bottom of the page</a:t>
             </a:r>
           </a:p>
           <a:p>
@@ -3334,6 +4170,38 @@
               <a:rPr lang="en-US" u="sng" dirty="0">
                 <a:hlinkClick r:id="rId3"/>
               </a:rPr>
+              <a:t>BYU Intro to </a:t>
+            </a:r>
+            <a:r>
+              <a:rPr lang="en-US" u="sng" dirty="0" err="1">
+                <a:hlinkClick r:id="rId3"/>
+              </a:rPr>
+              <a:t>Matlab</a:t>
+            </a:r>
+            <a:endParaRPr lang="en-US" u="sng" dirty="0"/>
+          </a:p>
+          <a:p>
+            <a:pPr lvl="1"/>
+            <a:r>
+              <a:rPr lang="en-US" dirty="0"/>
+              <a:t>Loosely used as an outline for this crash course</a:t>
+            </a:r>
+          </a:p>
+          <a:p>
+            <a:pPr lvl="1"/>
+            <a:r>
+              <a:rPr lang="en-US" dirty="0"/>
+              <a:t>PDF with less explicit cross references than the online material</a:t>
+            </a:r>
+          </a:p>
+          <a:p>
+            <a:pPr marL="0" indent="0">
+              <a:buNone/>
+            </a:pPr>
+            <a:r>
+              <a:rPr lang="en-US" u="sng" dirty="0">
+                <a:hlinkClick r:id="rId4"/>
+              </a:rPr>
               <a:t>Weitzman Institute</a:t>
             </a:r>
             <a:endParaRPr lang="en-US" u="sng" dirty="0"/>
@@ -3380,7 +4248,7 @@
             <a:pPr lvl="1"/>
             <a:r>
               <a:rPr lang="en-US" dirty="0"/>
-              <a:t>Has experience fitting data similar to the data you are fitting in your field </a:t>
+              <a:t>Easiest way to find answers about syntax problems or unknown errors</a:t>
             </a:r>
           </a:p>
         </p:txBody>
@@ -3388,7 +4256,7 @@
     </p:spTree>
     <p:extLst>
       <p:ext uri="{BB962C8B-B14F-4D97-AF65-F5344CB8AC3E}">
-        <p14:creationId xmlns:p14="http://schemas.microsoft.com/office/powerpoint/2010/main" val="3985250941"/>
+        <p14:creationId xmlns:p14="http://schemas.microsoft.com/office/powerpoint/2010/main" val="739725812"/>
       </p:ext>
     </p:extLst>
   </p:cSld>
@@ -3449,8 +4317,8 @@
         </p:nvSpPr>
         <p:spPr>
           <a:xfrm>
-            <a:off x="518160" y="1690688"/>
-            <a:ext cx="10515600" cy="1207135"/>
+            <a:off x="388133" y="1690688"/>
+            <a:ext cx="8003270" cy="1207135"/>
           </a:xfrm>
         </p:spPr>
         <p:txBody>
@@ -3486,8 +4354,8 @@
         </p:nvSpPr>
         <p:spPr>
           <a:xfrm>
-            <a:off x="762000" y="3016251"/>
-            <a:ext cx="6248400" cy="2585323"/>
+            <a:off x="893323" y="2685949"/>
+            <a:ext cx="6667987" cy="3416320"/>
           </a:xfrm>
           <a:prstGeom prst="rect">
             <a:avLst/>
@@ -3501,11 +4369,29 @@
           <a:p>
             <a:r>
               <a:rPr lang="en-US" b="1" i="1" dirty="0"/>
-              <a:t>Try to write a program that will create some test data for us to fit to.  Have 2 sets of data for each function, a low sample set and a high sample set. </a:t>
-            </a:r>
-          </a:p>
-          <a:p>
-            <a:endParaRPr lang="en-US" b="1" i="1" dirty="0"/>
+              <a:t>Try to write a program that will create some test data for us to fit functions to.  Have 2 sets of data for each function, a low sample rate set with random noise and a high sample rate set to compare the noisy one to. </a:t>
+            </a:r>
+            <a:r>
+              <a:rPr lang="en-US" b="1" i="1" dirty="0"/>
+              <a:t>Then plot both of the data sets for each function on the same graph to check that they </a:t>
+            </a:r>
+            <a:r>
+              <a:rPr lang="en-US" b="1" i="1" dirty="0" err="1"/>
+              <a:t>infact</a:t>
+            </a:r>
+            <a:r>
+              <a:rPr lang="en-US" b="1" i="1" dirty="0"/>
+              <a:t> overlap.  </a:t>
+            </a:r>
+          </a:p>
+          <a:p>
+            <a:endParaRPr lang="en-US" b="1" i="1" u="sng" dirty="0"/>
+          </a:p>
+          <a:p>
+            <a:r>
+              <a:rPr lang="en-US" b="1" i="1" u="sng" dirty="0"/>
+              <a:t>Function Types</a:t>
+            </a:r>
           </a:p>
           <a:p>
             <a:pPr marL="285750" indent="-285750">
@@ -3514,7 +4400,7 @@
             </a:pPr>
             <a:r>
               <a:rPr lang="en-US" b="1" i="1" dirty="0"/>
-              <a:t>A Polynomial Function with some noise on top of the data</a:t>
+              <a:t>Polynomial Function </a:t>
             </a:r>
           </a:p>
           <a:p>
@@ -3524,35 +4410,23 @@
             </a:pPr>
             <a:r>
               <a:rPr lang="en-US" b="1" i="1" dirty="0"/>
-              <a:t>1-2 periods of a sine function. </a:t>
-            </a:r>
-          </a:p>
-          <a:p>
-            <a:pPr marL="285750" indent="-285750">
-              <a:buFontTx/>
-              <a:buChar char="-"/>
-            </a:pPr>
+              <a:t>3 periods of a sine function. </a:t>
+            </a:r>
+          </a:p>
+          <a:p>
             <a:endParaRPr lang="en-US" b="1" i="1" dirty="0"/>
           </a:p>
           <a:p>
             <a:r>
               <a:rPr lang="en-US" b="1" i="1" dirty="0"/>
-              <a:t>Then plot both of the data sets on the same graph to check that they </a:t>
-            </a:r>
-            <a:r>
-              <a:rPr lang="en-US" b="1" i="1" dirty="0" err="1"/>
-              <a:t>infact</a:t>
-            </a:r>
-            <a:r>
-              <a:rPr lang="en-US" b="1" i="1" dirty="0"/>
-              <a:t> overlap.  </a:t>
+              <a:t>You are encouraged to use the commands from yesterday (creating variables, vector manipulation, for loops) to create the data set.  </a:t>
             </a:r>
           </a:p>
         </p:txBody>
       </p:sp>
       <p:pic>
         <p:nvPicPr>
-          <p:cNvPr id="9" name="Picture 8"/>
+          <p:cNvPr id="7" name="Picture 6"/>
           <p:cNvPicPr>
             <a:picLocks noChangeAspect="1"/>
           </p:cNvPicPr>
@@ -3566,8 +4440,8 @@
         </p:blipFill>
         <p:spPr>
           <a:xfrm>
-            <a:off x="8350247" y="4513084"/>
-            <a:ext cx="2569211" cy="1926908"/>
+            <a:off x="8705581" y="3978611"/>
+            <a:ext cx="2991119" cy="2243339"/>
           </a:xfrm>
           <a:prstGeom prst="rect">
             <a:avLst/>
@@ -3581,7 +4455,7 @@
       </p:pic>
       <p:pic>
         <p:nvPicPr>
-          <p:cNvPr id="10" name="Picture 9"/>
+          <p:cNvPr id="8" name="Picture 7"/>
           <p:cNvPicPr>
             <a:picLocks noChangeAspect="1"/>
           </p:cNvPicPr>
@@ -3595,8 +4469,8 @@
         </p:blipFill>
         <p:spPr>
           <a:xfrm>
-            <a:off x="8350248" y="2510135"/>
-            <a:ext cx="2569211" cy="1926908"/>
+            <a:off x="8705581" y="1159965"/>
+            <a:ext cx="2996117" cy="2247088"/>
           </a:xfrm>
           <a:prstGeom prst="rect">
             <a:avLst/>
@@ -3650,7 +4524,7 @@
         </p:nvSpPr>
         <p:spPr>
           <a:xfrm>
-            <a:off x="152400" y="26825"/>
+            <a:off x="262647" y="262647"/>
             <a:ext cx="10515600" cy="1325563"/>
           </a:xfrm>
         </p:spPr>
@@ -3662,36 +4536,20 @@
               <a:rPr lang="en-US" dirty="0"/>
               <a:t>This is what mine looks like</a:t>
             </a:r>
-          </a:p>
-        </p:txBody>
-      </p:sp>
-      <p:sp>
-        <p:nvSpPr>
-          <p:cNvPr id="3" name="Content Placeholder 2"/>
-          <p:cNvSpPr>
-            <a:spLocks noGrp="1"/>
-          </p:cNvSpPr>
-          <p:nvPr>
-            <p:ph idx="1"/>
-          </p:nvPr>
-        </p:nvSpPr>
-        <p:spPr>
-          <a:xfrm>
-            <a:off x="838200" y="1825625"/>
-            <a:ext cx="7056120" cy="4351338"/>
-          </a:xfrm>
-        </p:spPr>
-        <p:txBody>
-          <a:bodyPr/>
-          <a:lstStyle/>
-          <a:p>
-            <a:endParaRPr lang="en-US"/>
+            <a:br>
+              <a:rPr lang="en-US" dirty="0"/>
+            </a:br>
+            <a:r>
+              <a:rPr lang="en-US" sz="2800" dirty="0"/>
+              <a:t>Polynomial Function</a:t>
+            </a:r>
+            <a:endParaRPr lang="en-US" dirty="0"/>
           </a:p>
         </p:txBody>
       </p:sp>
       <p:pic>
         <p:nvPicPr>
-          <p:cNvPr id="4" name="Picture 3"/>
+          <p:cNvPr id="8" name="Picture 7"/>
           <p:cNvPicPr>
             <a:picLocks noChangeAspect="1"/>
           </p:cNvPicPr>
@@ -3705,8 +4563,8 @@
         </p:blipFill>
         <p:spPr>
           <a:xfrm>
-            <a:off x="8275320" y="3824288"/>
-            <a:ext cx="3421380" cy="2566035"/>
+            <a:off x="7795912" y="2150107"/>
+            <a:ext cx="3951328" cy="2963496"/>
           </a:xfrm>
           <a:prstGeom prst="rect">
             <a:avLst/>
@@ -3720,7 +4578,7 @@
       </p:pic>
       <p:pic>
         <p:nvPicPr>
-          <p:cNvPr id="5" name="Picture 4"/>
+          <p:cNvPr id="9" name="Picture 8"/>
           <p:cNvPicPr>
             <a:picLocks noChangeAspect="1"/>
           </p:cNvPicPr>
@@ -3734,8 +4592,8 @@
         </p:blipFill>
         <p:spPr>
           <a:xfrm>
-            <a:off x="8275320" y="1064894"/>
-            <a:ext cx="3421380" cy="2566035"/>
+            <a:off x="398835" y="1786582"/>
+            <a:ext cx="7075472" cy="3690547"/>
           </a:xfrm>
           <a:prstGeom prst="rect">
             <a:avLst/>
@@ -3745,30 +4603,6 @@
               <a:schemeClr val="tx1"/>
             </a:solidFill>
           </a:ln>
-        </p:spPr>
-      </p:pic>
-      <p:pic>
-        <p:nvPicPr>
-          <p:cNvPr id="6" name="Picture 5"/>
-          <p:cNvPicPr>
-            <a:picLocks noChangeAspect="1"/>
-          </p:cNvPicPr>
-          <p:nvPr/>
-        </p:nvPicPr>
-        <p:blipFill>
-          <a:blip r:embed="rId4"/>
-          <a:stretch>
-            <a:fillRect/>
-          </a:stretch>
-        </p:blipFill>
-        <p:spPr>
-          <a:xfrm>
-            <a:off x="1870016" y="1370331"/>
-            <a:ext cx="4526743" cy="4805680"/>
-          </a:xfrm>
-          <a:prstGeom prst="rect">
-            <a:avLst/>
-          </a:prstGeom>
         </p:spPr>
       </p:pic>
     </p:spTree>
@@ -3811,156 +4645,63 @@
             <p:ph type="title"/>
           </p:nvPr>
         </p:nvSpPr>
-        <p:spPr/>
+        <p:spPr>
+          <a:xfrm>
+            <a:off x="262646" y="350195"/>
+            <a:ext cx="10515600" cy="1325563"/>
+          </a:xfrm>
+        </p:spPr>
         <p:txBody>
           <a:bodyPr/>
           <a:lstStyle/>
           <a:p>
             <a:r>
               <a:rPr lang="en-US" dirty="0"/>
-              <a:t>Fitting data to a Function</a:t>
-            </a:r>
-          </a:p>
-        </p:txBody>
-      </p:sp>
-      <p:sp>
-        <p:nvSpPr>
-          <p:cNvPr id="3" name="Content Placeholder 2"/>
-          <p:cNvSpPr>
-            <a:spLocks noGrp="1"/>
-          </p:cNvSpPr>
-          <p:nvPr>
-            <p:ph idx="1"/>
-          </p:nvPr>
-        </p:nvSpPr>
-        <p:spPr>
-          <a:xfrm>
-            <a:off x="373380" y="1558925"/>
-            <a:ext cx="8549640" cy="1732915"/>
-          </a:xfrm>
-        </p:spPr>
-        <p:txBody>
-          <a:bodyPr/>
-          <a:lstStyle/>
-          <a:p>
-            <a:pPr marL="0" indent="0">
-              <a:buNone/>
-            </a:pPr>
-            <a:r>
+              <a:t>This is what mine looks like</a:t>
+            </a:r>
+            <a:br>
               <a:rPr lang="en-US" dirty="0"/>
-              <a:t>Using the GUI is the easiest way to generate code </a:t>
-            </a:r>
-          </a:p>
-          <a:p>
-            <a:r>
-              <a:rPr lang="en-US" dirty="0"/>
-              <a:t>With the Data in your workspace, open the fitting app</a:t>
-            </a:r>
-          </a:p>
-          <a:p>
-            <a:r>
-              <a:rPr lang="en-US" dirty="0"/>
-              <a:t>Select the variables to fit, and the fit type</a:t>
-            </a:r>
-          </a:p>
-        </p:txBody>
-      </p:sp>
-      <p:sp>
-        <p:nvSpPr>
-          <p:cNvPr id="4" name="Rectangle 3"/>
-          <p:cNvSpPr/>
-          <p:nvPr/>
-        </p:nvSpPr>
-        <p:spPr>
-          <a:xfrm>
-            <a:off x="2628900" y="5435749"/>
-            <a:ext cx="9288780" cy="646331"/>
-          </a:xfrm>
-          <a:prstGeom prst="rect">
-            <a:avLst/>
-          </a:prstGeom>
-        </p:spPr>
-        <p:txBody>
-          <a:bodyPr wrap="square">
-            <a:spAutoFit/>
-          </a:bodyPr>
-          <a:lstStyle/>
-          <a:p>
-            <a:r>
-              <a:rPr lang="en-US" b="1" i="1" dirty="0"/>
-              <a:t>Try setting up a fit to the test data you generated</a:t>
-            </a:r>
-          </a:p>
-          <a:p>
-            <a:r>
-              <a:rPr lang="en-US" b="1" i="1" dirty="0"/>
-              <a:t>Can you use the polynomial fit to get the polynomial expansion for your sine function?</a:t>
-            </a:r>
+            </a:br>
+            <a:r>
+              <a:rPr lang="en-US" sz="2800" dirty="0"/>
+              <a:t>Sinusoidal Function</a:t>
+            </a:r>
+            <a:endParaRPr lang="en-US" dirty="0"/>
           </a:p>
         </p:txBody>
       </p:sp>
       <p:pic>
         <p:nvPicPr>
-          <p:cNvPr id="5" name="Picture 4"/>
+          <p:cNvPr id="11" name="Picture 10"/>
           <p:cNvPicPr>
             <a:picLocks noChangeAspect="1"/>
           </p:cNvPicPr>
           <p:nvPr/>
         </p:nvPicPr>
-        <p:blipFill rotWithShape="1">
+        <p:blipFill>
           <a:blip r:embed="rId2"/>
-          <a:srcRect r="45821"/>
-          <a:stretch/>
+          <a:stretch>
+            <a:fillRect/>
+          </a:stretch>
         </p:blipFill>
         <p:spPr>
           <a:xfrm>
-            <a:off x="428693" y="3447415"/>
-            <a:ext cx="2802188" cy="1038225"/>
+            <a:off x="7892597" y="2363818"/>
+            <a:ext cx="3955918" cy="2966938"/>
           </a:xfrm>
           <a:prstGeom prst="rect">
             <a:avLst/>
           </a:prstGeom>
-        </p:spPr>
-      </p:pic>
-      <p:cxnSp>
-        <p:nvCxnSpPr>
-          <p:cNvPr id="7" name="Straight Arrow Connector 6"/>
-          <p:cNvCxnSpPr/>
-          <p:nvPr/>
-        </p:nvCxnSpPr>
-        <p:spPr>
-          <a:xfrm flipV="1">
-            <a:off x="1379220" y="4274820"/>
-            <a:ext cx="822960" cy="731520"/>
-          </a:xfrm>
-          <a:prstGeom prst="straightConnector1">
-            <a:avLst/>
-          </a:prstGeom>
-          <a:ln w="38100">
+          <a:ln>
             <a:solidFill>
               <a:schemeClr val="tx1"/>
             </a:solidFill>
-            <a:tailEnd type="triangle"/>
           </a:ln>
         </p:spPr>
-        <p:style>
-          <a:lnRef idx="1">
-            <a:schemeClr val="accent1"/>
-          </a:lnRef>
-          <a:fillRef idx="0">
-            <a:schemeClr val="accent1"/>
-          </a:fillRef>
-          <a:effectRef idx="0">
-            <a:schemeClr val="accent1"/>
-          </a:effectRef>
-          <a:fontRef idx="minor">
-            <a:schemeClr val="tx1"/>
-          </a:fontRef>
-        </p:style>
-      </p:cxnSp>
+      </p:pic>
       <p:pic>
         <p:nvPicPr>
-          <p:cNvPr id="8" name="Picture 7"/>
+          <p:cNvPr id="4" name="Picture 3"/>
           <p:cNvPicPr>
             <a:picLocks noChangeAspect="1"/>
           </p:cNvPicPr>
@@ -3974,152 +4715,23 @@
         </p:blipFill>
         <p:spPr>
           <a:xfrm>
-            <a:off x="7668713" y="2884488"/>
-            <a:ext cx="3537316" cy="2383155"/>
+            <a:off x="359922" y="2175802"/>
+            <a:ext cx="7040318" cy="3342970"/>
           </a:xfrm>
           <a:prstGeom prst="rect">
             <a:avLst/>
           </a:prstGeom>
-        </p:spPr>
-      </p:pic>
-      <p:sp>
-        <p:nvSpPr>
-          <p:cNvPr id="9" name="TextBox 8"/>
-          <p:cNvSpPr txBox="1"/>
-          <p:nvPr/>
-        </p:nvSpPr>
-        <p:spPr>
-          <a:xfrm>
-            <a:off x="4870676" y="4066859"/>
-            <a:ext cx="1613943" cy="369332"/>
-          </a:xfrm>
-          <a:prstGeom prst="rect">
-            <a:avLst/>
-          </a:prstGeom>
-          <a:noFill/>
-        </p:spPr>
-        <p:txBody>
-          <a:bodyPr wrap="square" rtlCol="0">
-            <a:spAutoFit/>
-          </a:bodyPr>
-          <a:lstStyle/>
-          <a:p>
-            <a:r>
-              <a:rPr lang="en-US" dirty="0"/>
-              <a:t>Variables to fit</a:t>
-            </a:r>
-          </a:p>
-        </p:txBody>
-      </p:sp>
-      <p:cxnSp>
-        <p:nvCxnSpPr>
-          <p:cNvPr id="12" name="Straight Arrow Connector 11"/>
-          <p:cNvCxnSpPr>
-            <a:stCxn id="9" idx="3"/>
-          </p:cNvCxnSpPr>
-          <p:nvPr/>
-        </p:nvCxnSpPr>
-        <p:spPr>
-          <a:xfrm flipV="1">
-            <a:off x="6484619" y="3447415"/>
-            <a:ext cx="1341121" cy="804110"/>
-          </a:xfrm>
-          <a:prstGeom prst="straightConnector1">
-            <a:avLst/>
-          </a:prstGeom>
-          <a:ln w="38100">
+          <a:ln>
             <a:solidFill>
               <a:schemeClr val="tx1"/>
             </a:solidFill>
-            <a:tailEnd type="triangle"/>
           </a:ln>
         </p:spPr>
-        <p:style>
-          <a:lnRef idx="1">
-            <a:schemeClr val="accent1"/>
-          </a:lnRef>
-          <a:fillRef idx="0">
-            <a:schemeClr val="accent1"/>
-          </a:fillRef>
-          <a:effectRef idx="0">
-            <a:schemeClr val="accent1"/>
-          </a:effectRef>
-          <a:fontRef idx="minor">
-            <a:schemeClr val="tx1"/>
-          </a:fontRef>
-        </p:style>
-      </p:cxnSp>
-      <p:sp>
-        <p:nvSpPr>
-          <p:cNvPr id="13" name="TextBox 12"/>
-          <p:cNvSpPr txBox="1"/>
-          <p:nvPr/>
-        </p:nvSpPr>
-        <p:spPr>
-          <a:xfrm>
-            <a:off x="9829800" y="2130306"/>
-            <a:ext cx="891591" cy="369332"/>
-          </a:xfrm>
-          <a:prstGeom prst="rect">
-            <a:avLst/>
-          </a:prstGeom>
-          <a:noFill/>
-        </p:spPr>
-        <p:txBody>
-          <a:bodyPr wrap="none" rtlCol="0">
-            <a:spAutoFit/>
-          </a:bodyPr>
-          <a:lstStyle/>
-          <a:p>
-            <a:r>
-              <a:rPr lang="en-US" dirty="0"/>
-              <a:t>Fit type</a:t>
-            </a:r>
-          </a:p>
-        </p:txBody>
-      </p:sp>
-      <p:cxnSp>
-        <p:nvCxnSpPr>
-          <p:cNvPr id="15" name="Straight Arrow Connector 14"/>
-          <p:cNvCxnSpPr>
-            <a:stCxn id="13" idx="2"/>
-          </p:cNvCxnSpPr>
-          <p:nvPr/>
-        </p:nvCxnSpPr>
-        <p:spPr>
-          <a:xfrm flipH="1">
-            <a:off x="9768840" y="2499638"/>
-            <a:ext cx="506756" cy="731242"/>
-          </a:xfrm>
-          <a:prstGeom prst="straightConnector1">
-            <a:avLst/>
-          </a:prstGeom>
-          <a:ln w="38100">
-            <a:solidFill>
-              <a:schemeClr val="tx1"/>
-            </a:solidFill>
-            <a:tailEnd type="triangle"/>
-          </a:ln>
-        </p:spPr>
-        <p:style>
-          <a:lnRef idx="1">
-            <a:schemeClr val="accent1"/>
-          </a:lnRef>
-          <a:fillRef idx="0">
-            <a:schemeClr val="accent1"/>
-          </a:fillRef>
-          <a:effectRef idx="0">
-            <a:schemeClr val="accent1"/>
-          </a:effectRef>
-          <a:fontRef idx="minor">
-            <a:schemeClr val="tx1"/>
-          </a:fontRef>
-        </p:style>
-      </p:cxnSp>
+      </p:pic>
     </p:spTree>
     <p:extLst>
       <p:ext uri="{BB962C8B-B14F-4D97-AF65-F5344CB8AC3E}">
-        <p14:creationId xmlns:p14="http://schemas.microsoft.com/office/powerpoint/2010/main" val="1324146652"/>
+        <p14:creationId xmlns:p14="http://schemas.microsoft.com/office/powerpoint/2010/main" val="1111142575"/>
       </p:ext>
     </p:extLst>
   </p:cSld>
@@ -4163,7 +4775,7 @@
           <a:p>
             <a:r>
               <a:rPr lang="en-US" dirty="0"/>
-              <a:t>Analyzing the Fit</a:t>
+              <a:t>Sub Plots in Figures</a:t>
             </a:r>
           </a:p>
         </p:txBody>
@@ -4178,27 +4790,151 @@
             <p:ph idx="1"/>
           </p:nvPr>
         </p:nvSpPr>
-        <p:spPr/>
-        <p:txBody>
-          <a:bodyPr/>
-          <a:lstStyle/>
-          <a:p>
+        <p:spPr>
+          <a:xfrm>
+            <a:off x="507459" y="1553251"/>
+            <a:ext cx="6875835" cy="3096570"/>
+          </a:xfrm>
+        </p:spPr>
+        <p:txBody>
+          <a:bodyPr/>
+          <a:lstStyle/>
+          <a:p>
+            <a:pPr marL="0" indent="0">
+              <a:buNone/>
+            </a:pPr>
             <a:r>
               <a:rPr lang="en-US" dirty="0"/>
-              <a:t>The Fitting App gives a quality of fit</a:t>
+              <a:t>In </a:t>
+            </a:r>
+            <a:r>
+              <a:rPr lang="en-US" dirty="0" err="1"/>
+              <a:t>Matlab</a:t>
+            </a:r>
+            <a:r>
+              <a:rPr lang="en-US" dirty="0"/>
+              <a:t> you can make one figure with multiple plots on it using the subplot command.  </a:t>
             </a:r>
           </a:p>
           <a:p>
             <a:pPr marL="0" indent="0">
               <a:buNone/>
             </a:pPr>
-            <a:endParaRPr lang="en-US" dirty="0"/>
+            <a:r>
+              <a:rPr lang="en-US" u="sng" dirty="0"/>
+              <a:t>There are 3 parts to the command</a:t>
+            </a:r>
+          </a:p>
+          <a:p>
+            <a:pPr marL="514350" indent="-514350">
+              <a:buFont typeface="+mj-lt"/>
+              <a:buAutoNum type="alphaUcPeriod"/>
+            </a:pPr>
+            <a:r>
+              <a:rPr lang="en-US" sz="2000" dirty="0"/>
+              <a:t>The Number of columns of graphs</a:t>
+            </a:r>
+          </a:p>
+          <a:p>
+            <a:pPr marL="514350" indent="-514350">
+              <a:buFont typeface="+mj-lt"/>
+              <a:buAutoNum type="alphaUcPeriod"/>
+            </a:pPr>
+            <a:r>
+              <a:rPr lang="en-US" sz="2000" dirty="0"/>
+              <a:t>The Number of Rows of graphs</a:t>
+            </a:r>
+          </a:p>
+          <a:p>
+            <a:pPr marL="514350" indent="-514350">
+              <a:buFont typeface="+mj-lt"/>
+              <a:buAutoNum type="alphaUcPeriod"/>
+            </a:pPr>
+            <a:r>
+              <a:rPr lang="en-US" sz="2000" dirty="0"/>
+              <a:t>The position you want the next plot command to access</a:t>
+            </a:r>
+          </a:p>
+        </p:txBody>
+      </p:sp>
+      <p:sp>
+        <p:nvSpPr>
+          <p:cNvPr id="5" name="TextBox 4"/>
+          <p:cNvSpPr txBox="1"/>
+          <p:nvPr/>
+        </p:nvSpPr>
+        <p:spPr>
+          <a:xfrm>
+            <a:off x="6374844" y="2878814"/>
+            <a:ext cx="2016899" cy="923330"/>
+          </a:xfrm>
+          <a:prstGeom prst="rect">
+            <a:avLst/>
+          </a:prstGeom>
+          <a:noFill/>
+          <a:ln>
+            <a:solidFill>
+              <a:schemeClr val="tx1"/>
+            </a:solidFill>
+          </a:ln>
+        </p:spPr>
+        <p:txBody>
+          <a:bodyPr wrap="none" rtlCol="0">
+            <a:spAutoFit/>
+          </a:bodyPr>
+          <a:lstStyle/>
+          <a:p>
+            <a:r>
+              <a:rPr lang="en-US" dirty="0"/>
+              <a:t>figure ;</a:t>
+            </a:r>
+          </a:p>
+          <a:p>
+            <a:r>
+              <a:rPr lang="en-US" dirty="0"/>
+              <a:t>subplot ( A , B , C ) ;</a:t>
+            </a:r>
+          </a:p>
+          <a:p>
+            <a:r>
+              <a:rPr lang="en-US" dirty="0"/>
+              <a:t>plot ( x1 , y1 , ’ . ’ ) ;</a:t>
+            </a:r>
+          </a:p>
+        </p:txBody>
+      </p:sp>
+      <p:sp>
+        <p:nvSpPr>
+          <p:cNvPr id="6" name="TextBox 5"/>
+          <p:cNvSpPr txBox="1"/>
+          <p:nvPr/>
+        </p:nvSpPr>
+        <p:spPr>
+          <a:xfrm>
+            <a:off x="6374844" y="2509482"/>
+            <a:ext cx="1512594" cy="369332"/>
+          </a:xfrm>
+          <a:prstGeom prst="rect">
+            <a:avLst/>
+          </a:prstGeom>
+          <a:noFill/>
+        </p:spPr>
+        <p:txBody>
+          <a:bodyPr wrap="none" rtlCol="0">
+            <a:spAutoFit/>
+          </a:bodyPr>
+          <a:lstStyle/>
+          <a:p>
+            <a:r>
+              <a:rPr lang="en-US" dirty="0"/>
+              <a:t>Example Code</a:t>
+            </a:r>
           </a:p>
         </p:txBody>
       </p:sp>
       <p:pic>
         <p:nvPicPr>
-          <p:cNvPr id="4" name="Picture 3"/>
+          <p:cNvPr id="8" name="Picture 7"/>
           <p:cNvPicPr>
             <a:picLocks noChangeAspect="1"/>
           </p:cNvPicPr>
@@ -4212,8 +4948,8 @@
         </p:blipFill>
         <p:spPr>
           <a:xfrm>
-            <a:off x="6795135" y="2218214"/>
-            <a:ext cx="4654202" cy="3237706"/>
+            <a:off x="9007813" y="1037286"/>
+            <a:ext cx="2676728" cy="3205406"/>
           </a:xfrm>
           <a:prstGeom prst="rect">
             <a:avLst/>
@@ -4227,36 +4963,65 @@
       </p:pic>
       <p:sp>
         <p:nvSpPr>
-          <p:cNvPr id="5" name="Rectangle 4"/>
+          <p:cNvPr id="9" name="Rectangle 8"/>
           <p:cNvSpPr/>
           <p:nvPr/>
         </p:nvSpPr>
         <p:spPr>
           <a:xfrm>
-            <a:off x="546735" y="3923031"/>
-            <a:ext cx="6248400" cy="646331"/>
+            <a:off x="740925" y="5077838"/>
+            <a:ext cx="6096000" cy="646331"/>
           </a:xfrm>
           <a:prstGeom prst="rect">
             <a:avLst/>
           </a:prstGeom>
         </p:spPr>
         <p:txBody>
-          <a:bodyPr wrap="square">
+          <a:bodyPr>
             <a:spAutoFit/>
           </a:bodyPr>
           <a:lstStyle/>
           <a:p>
             <a:r>
               <a:rPr lang="en-US" b="1" i="1" dirty="0"/>
-              <a:t>Try adding more and more random noise to your data and see what happens to the different goodness of fit parameters.</a:t>
-            </a:r>
-          </a:p>
-        </p:txBody>
-      </p:sp>
+              <a:t>Try to replicate the graphs on the right using the test data you generated earlier today and the subplot command.  </a:t>
+            </a:r>
+          </a:p>
+        </p:txBody>
+      </p:sp>
+      <p:pic>
+        <p:nvPicPr>
+          <p:cNvPr id="10" name="Picture 9"/>
+          <p:cNvPicPr>
+            <a:picLocks noChangeAspect="1"/>
+          </p:cNvPicPr>
+          <p:nvPr/>
+        </p:nvPicPr>
+        <p:blipFill>
+          <a:blip r:embed="rId3"/>
+          <a:stretch>
+            <a:fillRect/>
+          </a:stretch>
+        </p:blipFill>
+        <p:spPr>
+          <a:xfrm>
+            <a:off x="9007813" y="4649821"/>
+            <a:ext cx="2676728" cy="2007546"/>
+          </a:xfrm>
+          <a:prstGeom prst="rect">
+            <a:avLst/>
+          </a:prstGeom>
+          <a:ln>
+            <a:solidFill>
+              <a:schemeClr val="tx1"/>
+            </a:solidFill>
+          </a:ln>
+        </p:spPr>
+      </p:pic>
     </p:spTree>
     <p:extLst>
       <p:ext uri="{BB962C8B-B14F-4D97-AF65-F5344CB8AC3E}">
-        <p14:creationId xmlns:p14="http://schemas.microsoft.com/office/powerpoint/2010/main" val="2121419604"/>
+        <p14:creationId xmlns:p14="http://schemas.microsoft.com/office/powerpoint/2010/main" val="1138218245"/>
       </p:ext>
     </p:extLst>
   </p:cSld>
@@ -4293,145 +5058,216 @@
             <p:ph type="title"/>
           </p:nvPr>
         </p:nvSpPr>
-        <p:spPr/>
+        <p:spPr>
+          <a:xfrm>
+            <a:off x="262646" y="350195"/>
+            <a:ext cx="10515600" cy="1325563"/>
+          </a:xfrm>
+        </p:spPr>
         <p:txBody>
           <a:bodyPr/>
           <a:lstStyle/>
           <a:p>
             <a:r>
               <a:rPr lang="en-US" dirty="0"/>
-              <a:t>Importing Data</a:t>
-            </a:r>
-          </a:p>
-        </p:txBody>
-      </p:sp>
-      <p:sp>
-        <p:nvSpPr>
-          <p:cNvPr id="3" name="Content Placeholder 2"/>
-          <p:cNvSpPr>
-            <a:spLocks noGrp="1"/>
-          </p:cNvSpPr>
-          <p:nvPr>
-            <p:ph idx="1"/>
-          </p:nvPr>
-        </p:nvSpPr>
-        <p:spPr>
-          <a:xfrm>
-            <a:off x="838200" y="1848485"/>
-            <a:ext cx="10515600" cy="3104515"/>
-          </a:xfrm>
-        </p:spPr>
-        <p:txBody>
-          <a:bodyPr/>
-          <a:lstStyle/>
-          <a:p>
-            <a:pPr marL="0" indent="0">
-              <a:buNone/>
-            </a:pPr>
-            <a:r>
+              <a:t>This is what mine looks like</a:t>
+            </a:r>
+            <a:br>
               <a:rPr lang="en-US" dirty="0"/>
-              <a:t>Using Code – </a:t>
-            </a:r>
-            <a:r>
-              <a:rPr lang="en-US" dirty="0" err="1"/>
-              <a:t>Matlab</a:t>
-            </a:r>
-            <a:r>
-              <a:rPr lang="en-US" dirty="0"/>
-              <a:t> has support for importing a large variety of different file formats (</a:t>
-            </a:r>
-            <a:r>
-              <a:rPr lang="en-US" dirty="0">
-                <a:hlinkClick r:id="rId2"/>
-              </a:rPr>
-              <a:t>see her</a:t>
-            </a:r>
-            <a:r>
-              <a:rPr lang="en-US" dirty="0"/>
-              <a:t>e).  For today we will stick to using csv files (</a:t>
-            </a:r>
-            <a:r>
-              <a:rPr lang="en-US" dirty="0" err="1"/>
-              <a:t>csvread</a:t>
-            </a:r>
-            <a:r>
-              <a:rPr lang="en-US" dirty="0"/>
-              <a:t> and </a:t>
-            </a:r>
-            <a:r>
-              <a:rPr lang="en-US" dirty="0" err="1"/>
-              <a:t>csvwrite</a:t>
-            </a:r>
-            <a:r>
-              <a:rPr lang="en-US" dirty="0"/>
-              <a:t> commands).</a:t>
-            </a:r>
-          </a:p>
-          <a:p>
-            <a:pPr marL="0" indent="0">
-              <a:buNone/>
-            </a:pPr>
+            </a:br>
+            <a:r>
+              <a:rPr lang="en-US" sz="2800" dirty="0"/>
+              <a:t>Utilizing Sub Plots to make Figures</a:t>
+            </a:r>
             <a:endParaRPr lang="en-US" dirty="0"/>
           </a:p>
-          <a:p>
-            <a:pPr marL="0" indent="0">
-              <a:buNone/>
-            </a:pPr>
-            <a:r>
-              <a:rPr lang="en-US" dirty="0"/>
-              <a:t>Like we did yesterday, if you have the data file downloaded you can drag and drop it into the workspace to import the data.  </a:t>
-            </a:r>
-          </a:p>
-        </p:txBody>
-      </p:sp>
-      <p:sp>
-        <p:nvSpPr>
-          <p:cNvPr id="4" name="Rectangle 3"/>
-          <p:cNvSpPr/>
+        </p:txBody>
+      </p:sp>
+      <p:pic>
+        <p:nvPicPr>
+          <p:cNvPr id="3" name="Picture 2"/>
+          <p:cNvPicPr>
+            <a:picLocks noChangeAspect="1"/>
+          </p:cNvPicPr>
           <p:nvPr/>
-        </p:nvSpPr>
-        <p:spPr>
-          <a:xfrm>
-            <a:off x="2855595" y="4953000"/>
-            <a:ext cx="6248400" cy="1200329"/>
+        </p:nvPicPr>
+        <p:blipFill>
+          <a:blip r:embed="rId2"/>
+          <a:stretch>
+            <a:fillRect/>
+          </a:stretch>
+        </p:blipFill>
+        <p:spPr>
+          <a:xfrm>
+            <a:off x="8165886" y="1570757"/>
+            <a:ext cx="3643493" cy="4363116"/>
           </a:xfrm>
           <a:prstGeom prst="rect">
             <a:avLst/>
           </a:prstGeom>
-        </p:spPr>
-        <p:txBody>
-          <a:bodyPr wrap="square">
-            <a:spAutoFit/>
-          </a:bodyPr>
-          <a:lstStyle/>
-          <a:p>
-            <a:r>
-              <a:rPr lang="en-US" b="1" i="1" dirty="0"/>
-              <a:t>Try downloading the sample functions in the </a:t>
-            </a:r>
-            <a:r>
-              <a:rPr lang="en-US" b="1" i="1" dirty="0" err="1"/>
-              <a:t>Github</a:t>
-            </a:r>
-            <a:r>
-              <a:rPr lang="en-US" b="1" i="1" dirty="0"/>
-              <a:t> folder and figure out what the functions are.  If there is extra time, download the Boston marathon Data, and try fitting the outcomes to different functions (histograms to Gaussians </a:t>
-            </a:r>
-            <a:r>
-              <a:rPr lang="en-US" b="1" i="1" dirty="0" err="1"/>
-              <a:t>etc</a:t>
-            </a:r>
-            <a:r>
-              <a:rPr lang="en-US" b="1" i="1" dirty="0"/>
-              <a:t>)</a:t>
-            </a:r>
-          </a:p>
-        </p:txBody>
-      </p:sp>
+          <a:ln>
+            <a:solidFill>
+              <a:schemeClr val="tx1"/>
+            </a:solidFill>
+          </a:ln>
+        </p:spPr>
+      </p:pic>
+      <p:pic>
+        <p:nvPicPr>
+          <p:cNvPr id="5" name="Picture 4"/>
+          <p:cNvPicPr>
+            <a:picLocks noChangeAspect="1"/>
+          </p:cNvPicPr>
+          <p:nvPr/>
+        </p:nvPicPr>
+        <p:blipFill>
+          <a:blip r:embed="rId3"/>
+          <a:stretch>
+            <a:fillRect/>
+          </a:stretch>
+        </p:blipFill>
+        <p:spPr>
+          <a:xfrm>
+            <a:off x="408562" y="2748298"/>
+            <a:ext cx="7402749" cy="2008033"/>
+          </a:xfrm>
+          <a:prstGeom prst="rect">
+            <a:avLst/>
+          </a:prstGeom>
+          <a:ln>
+            <a:solidFill>
+              <a:schemeClr val="tx1"/>
+            </a:solidFill>
+          </a:ln>
+        </p:spPr>
+      </p:pic>
     </p:spTree>
     <p:extLst>
       <p:ext uri="{BB962C8B-B14F-4D97-AF65-F5344CB8AC3E}">
-        <p14:creationId xmlns:p14="http://schemas.microsoft.com/office/powerpoint/2010/main" val="1081705465"/>
+        <p14:creationId xmlns:p14="http://schemas.microsoft.com/office/powerpoint/2010/main" val="353788835"/>
+      </p:ext>
+    </p:extLst>
+  </p:cSld>
+  <p:clrMapOvr>
+    <a:masterClrMapping/>
+  </p:clrMapOvr>
+</p:sld>
+</file>
+
+<file path=ppt/slides/slide9.xml><?xml version="1.0" encoding="utf-8"?>
+<p:sld xmlns:a="http://schemas.openxmlformats.org/drawingml/2006/main" xmlns:r="http://schemas.openxmlformats.org/officeDocument/2006/relationships" xmlns:p="http://schemas.openxmlformats.org/presentationml/2006/main">
+  <p:cSld>
+    <p:spTree>
+      <p:nvGrpSpPr>
+        <p:cNvPr id="1" name=""/>
+        <p:cNvGrpSpPr/>
+        <p:nvPr/>
+      </p:nvGrpSpPr>
+      <p:grpSpPr>
+        <a:xfrm>
+          <a:off x="0" y="0"/>
+          <a:ext cx="0" cy="0"/>
+          <a:chOff x="0" y="0"/>
+          <a:chExt cx="0" cy="0"/>
+        </a:xfrm>
+      </p:grpSpPr>
+      <p:sp>
+        <p:nvSpPr>
+          <p:cNvPr id="2" name="Title 1"/>
+          <p:cNvSpPr>
+            <a:spLocks noGrp="1"/>
+          </p:cNvSpPr>
+          <p:nvPr>
+            <p:ph type="title"/>
+          </p:nvPr>
+        </p:nvSpPr>
+        <p:spPr>
+          <a:xfrm>
+            <a:off x="262646" y="350195"/>
+            <a:ext cx="10515600" cy="1325563"/>
+          </a:xfrm>
+        </p:spPr>
+        <p:txBody>
+          <a:bodyPr/>
+          <a:lstStyle/>
+          <a:p>
+            <a:r>
+              <a:rPr lang="en-US" dirty="0"/>
+              <a:t>This is what mine looks like</a:t>
+            </a:r>
+            <a:br>
+              <a:rPr lang="en-US" dirty="0"/>
+            </a:br>
+            <a:r>
+              <a:rPr lang="en-US" sz="2800" dirty="0"/>
+              <a:t>3 Graphs with different geometries in a sub plot</a:t>
+            </a:r>
+            <a:endParaRPr lang="en-US" dirty="0"/>
+          </a:p>
+        </p:txBody>
+      </p:sp>
+      <p:pic>
+        <p:nvPicPr>
+          <p:cNvPr id="4" name="Picture 3"/>
+          <p:cNvPicPr>
+            <a:picLocks noChangeAspect="1"/>
+          </p:cNvPicPr>
+          <p:nvPr/>
+        </p:nvPicPr>
+        <p:blipFill>
+          <a:blip r:embed="rId2"/>
+          <a:stretch>
+            <a:fillRect/>
+          </a:stretch>
+        </p:blipFill>
+        <p:spPr>
+          <a:xfrm>
+            <a:off x="8388484" y="2529192"/>
+            <a:ext cx="3438728" cy="2579046"/>
+          </a:xfrm>
+          <a:prstGeom prst="rect">
+            <a:avLst/>
+          </a:prstGeom>
+          <a:ln>
+            <a:solidFill>
+              <a:schemeClr val="tx1"/>
+            </a:solidFill>
+          </a:ln>
+        </p:spPr>
+      </p:pic>
+      <p:pic>
+        <p:nvPicPr>
+          <p:cNvPr id="7" name="Picture 6"/>
+          <p:cNvPicPr>
+            <a:picLocks noChangeAspect="1"/>
+          </p:cNvPicPr>
+          <p:nvPr/>
+        </p:nvPicPr>
+        <p:blipFill>
+          <a:blip r:embed="rId3"/>
+          <a:stretch>
+            <a:fillRect/>
+          </a:stretch>
+        </p:blipFill>
+        <p:spPr>
+          <a:xfrm>
+            <a:off x="408563" y="2739519"/>
+            <a:ext cx="7255740" cy="2158391"/>
+          </a:xfrm>
+          <a:prstGeom prst="rect">
+            <a:avLst/>
+          </a:prstGeom>
+          <a:ln>
+            <a:solidFill>
+              <a:schemeClr val="tx1"/>
+            </a:solidFill>
+          </a:ln>
+        </p:spPr>
+      </p:pic>
+    </p:spTree>
+    <p:extLst>
+      <p:ext uri="{BB962C8B-B14F-4D97-AF65-F5344CB8AC3E}">
+        <p14:creationId xmlns:p14="http://schemas.microsoft.com/office/powerpoint/2010/main" val="2843677256"/>
       </p:ext>
     </p:extLst>
   </p:cSld>

</xml_diff>

<commit_message>
Reorganized Plot and Subplot Stuff.  Also added code for fitting
</commit_message>
<xml_diff>
--- a/Day 2 of Crash Course/University of Illinois REU Introduction to Matlab Day 2 with examples.pptx
+++ b/Day 2 of Crash Course/University of Illinois REU Introduction to Matlab Day 2 with examples.pptx
@@ -15,8 +15,10 @@
     <p:sldId id="267" r:id="rId9"/>
     <p:sldId id="268" r:id="rId10"/>
     <p:sldId id="261" r:id="rId11"/>
-    <p:sldId id="262" r:id="rId12"/>
-    <p:sldId id="259" r:id="rId13"/>
+    <p:sldId id="270" r:id="rId12"/>
+    <p:sldId id="269" r:id="rId13"/>
+    <p:sldId id="262" r:id="rId14"/>
+    <p:sldId id="259" r:id="rId15"/>
   </p:sldIdLst>
   <p:sldSz cx="12192000" cy="6858000"/>
   <p:notesSz cx="6858000" cy="9144000"/>
@@ -252,7 +254,7 @@
           <a:p>
             <a:fld id="{4F813D5D-9D8E-4484-BE86-4458FD589FAD}" type="datetimeFigureOut">
               <a:rPr lang="en-US" smtClean="0"/>
-              <a:t>6/30/2017</a:t>
+              <a:t>7/1/2017</a:t>
             </a:fld>
             <a:endParaRPr lang="en-US"/>
           </a:p>
@@ -420,7 +422,7 @@
           <a:p>
             <a:fld id="{4F813D5D-9D8E-4484-BE86-4458FD589FAD}" type="datetimeFigureOut">
               <a:rPr lang="en-US" smtClean="0"/>
-              <a:t>6/30/2017</a:t>
+              <a:t>7/1/2017</a:t>
             </a:fld>
             <a:endParaRPr lang="en-US"/>
           </a:p>
@@ -598,7 +600,7 @@
           <a:p>
             <a:fld id="{4F813D5D-9D8E-4484-BE86-4458FD589FAD}" type="datetimeFigureOut">
               <a:rPr lang="en-US" smtClean="0"/>
-              <a:t>6/30/2017</a:t>
+              <a:t>7/1/2017</a:t>
             </a:fld>
             <a:endParaRPr lang="en-US"/>
           </a:p>
@@ -766,7 +768,7 @@
           <a:p>
             <a:fld id="{4F813D5D-9D8E-4484-BE86-4458FD589FAD}" type="datetimeFigureOut">
               <a:rPr lang="en-US" smtClean="0"/>
-              <a:t>6/30/2017</a:t>
+              <a:t>7/1/2017</a:t>
             </a:fld>
             <a:endParaRPr lang="en-US"/>
           </a:p>
@@ -1011,7 +1013,7 @@
           <a:p>
             <a:fld id="{4F813D5D-9D8E-4484-BE86-4458FD589FAD}" type="datetimeFigureOut">
               <a:rPr lang="en-US" smtClean="0"/>
-              <a:t>6/30/2017</a:t>
+              <a:t>7/1/2017</a:t>
             </a:fld>
             <a:endParaRPr lang="en-US"/>
           </a:p>
@@ -1240,7 +1242,7 @@
           <a:p>
             <a:fld id="{4F813D5D-9D8E-4484-BE86-4458FD589FAD}" type="datetimeFigureOut">
               <a:rPr lang="en-US" smtClean="0"/>
-              <a:t>6/30/2017</a:t>
+              <a:t>7/1/2017</a:t>
             </a:fld>
             <a:endParaRPr lang="en-US"/>
           </a:p>
@@ -1604,7 +1606,7 @@
           <a:p>
             <a:fld id="{4F813D5D-9D8E-4484-BE86-4458FD589FAD}" type="datetimeFigureOut">
               <a:rPr lang="en-US" smtClean="0"/>
-              <a:t>6/30/2017</a:t>
+              <a:t>7/1/2017</a:t>
             </a:fld>
             <a:endParaRPr lang="en-US"/>
           </a:p>
@@ -1721,7 +1723,7 @@
           <a:p>
             <a:fld id="{4F813D5D-9D8E-4484-BE86-4458FD589FAD}" type="datetimeFigureOut">
               <a:rPr lang="en-US" smtClean="0"/>
-              <a:t>6/30/2017</a:t>
+              <a:t>7/1/2017</a:t>
             </a:fld>
             <a:endParaRPr lang="en-US"/>
           </a:p>
@@ -1816,7 +1818,7 @@
           <a:p>
             <a:fld id="{4F813D5D-9D8E-4484-BE86-4458FD589FAD}" type="datetimeFigureOut">
               <a:rPr lang="en-US" smtClean="0"/>
-              <a:t>6/30/2017</a:t>
+              <a:t>7/1/2017</a:t>
             </a:fld>
             <a:endParaRPr lang="en-US"/>
           </a:p>
@@ -2091,7 +2093,7 @@
           <a:p>
             <a:fld id="{4F813D5D-9D8E-4484-BE86-4458FD589FAD}" type="datetimeFigureOut">
               <a:rPr lang="en-US" smtClean="0"/>
-              <a:t>6/30/2017</a:t>
+              <a:t>7/1/2017</a:t>
             </a:fld>
             <a:endParaRPr lang="en-US"/>
           </a:p>
@@ -2346,7 +2348,7 @@
           <a:p>
             <a:fld id="{4F813D5D-9D8E-4484-BE86-4458FD589FAD}" type="datetimeFigureOut">
               <a:rPr lang="en-US" smtClean="0"/>
-              <a:t>6/30/2017</a:t>
+              <a:t>7/1/2017</a:t>
             </a:fld>
             <a:endParaRPr lang="en-US"/>
           </a:p>
@@ -2593,7 +2595,7 @@
           <a:p>
             <a:fld id="{4F813D5D-9D8E-4484-BE86-4458FD589FAD}" type="datetimeFigureOut">
               <a:rPr lang="en-US" smtClean="0"/>
-              <a:t>6/30/2017</a:t>
+              <a:t>7/1/2017</a:t>
             </a:fld>
             <a:endParaRPr lang="en-US"/>
           </a:p>
@@ -3104,8 +3106,8 @@
         </p:nvSpPr>
         <p:spPr>
           <a:xfrm>
-            <a:off x="89170" y="77787"/>
-            <a:ext cx="10515600" cy="1325563"/>
+            <a:off x="129877" y="189025"/>
+            <a:ext cx="10515600" cy="808431"/>
           </a:xfrm>
         </p:spPr>
         <p:txBody>
@@ -3131,21 +3133,81 @@
         </p:nvSpPr>
         <p:spPr>
           <a:xfrm>
-            <a:off x="169137" y="1190208"/>
-            <a:ext cx="8549640" cy="1732915"/>
-          </a:xfrm>
-        </p:spPr>
-        <p:txBody>
-          <a:bodyPr/>
+            <a:off x="118156" y="1186274"/>
+            <a:ext cx="8549640" cy="3041979"/>
+          </a:xfrm>
+        </p:spPr>
+        <p:txBody>
+          <a:bodyPr>
+            <a:normAutofit/>
+          </a:bodyPr>
           <a:lstStyle/>
           <a:p>
             <a:pPr marL="0" indent="0">
               <a:buNone/>
             </a:pPr>
             <a:r>
-              <a:rPr lang="en-US" dirty="0"/>
+              <a:rPr lang="en-US" u="sng" dirty="0"/>
               <a:t>Using Code</a:t>
             </a:r>
+            <a:endParaRPr lang="en-US" dirty="0"/>
+          </a:p>
+          <a:p>
+            <a:pPr marL="0" indent="0">
+              <a:buNone/>
+            </a:pPr>
+            <a:r>
+              <a:rPr lang="en-US" dirty="0"/>
+              <a:t>Functional forms commonly used in physics</a:t>
+            </a:r>
+          </a:p>
+          <a:p>
+            <a:pPr>
+              <a:buFontTx/>
+              <a:buChar char="-"/>
+            </a:pPr>
+            <a:r>
+              <a:rPr lang="en-US" sz="2000" dirty="0"/>
+              <a:t>Polynomial (up to 8)</a:t>
+            </a:r>
+          </a:p>
+          <a:p>
+            <a:pPr>
+              <a:buFontTx/>
+              <a:buChar char="-"/>
+            </a:pPr>
+            <a:r>
+              <a:rPr lang="en-US" sz="2000" dirty="0"/>
+              <a:t>Sum of Sins (up to 6)</a:t>
+            </a:r>
+          </a:p>
+          <a:p>
+            <a:pPr>
+              <a:buFontTx/>
+              <a:buChar char="-"/>
+            </a:pPr>
+            <a:r>
+              <a:rPr lang="en-US" sz="2000" dirty="0"/>
+              <a:t>Gaussian (up to 2)</a:t>
+            </a:r>
+          </a:p>
+          <a:p>
+            <a:pPr>
+              <a:buFontTx/>
+              <a:buChar char="-"/>
+            </a:pPr>
+            <a:r>
+              <a:rPr lang="en-US" sz="2000" dirty="0"/>
+              <a:t>Exponential (up to 3)</a:t>
+            </a:r>
+            <a:endParaRPr lang="en-US" dirty="0"/>
+          </a:p>
+          <a:p>
+            <a:pPr>
+              <a:buFontTx/>
+              <a:buChar char="-"/>
+            </a:pPr>
+            <a:endParaRPr lang="en-US" dirty="0"/>
           </a:p>
         </p:txBody>
       </p:sp>
@@ -3157,8 +3219,8 @@
         </p:nvSpPr>
         <p:spPr>
           <a:xfrm>
-            <a:off x="6608547" y="1022278"/>
-            <a:ext cx="4939219" cy="369332"/>
+            <a:off x="449133" y="4374859"/>
+            <a:ext cx="5565426" cy="1477328"/>
           </a:xfrm>
           <a:prstGeom prst="rect">
             <a:avLst/>
@@ -3172,7 +3234,7 @@
           <a:p>
             <a:r>
               <a:rPr lang="en-US" b="1" i="1" dirty="0"/>
-              <a:t>Try setting up a fit to the test data you generated</a:t>
+              <a:t>Try setting up a fit to the test data you generated earlier today.  Try to extract the coefficients using both code and the GUI and compare them to the values you used to create the data set.  How do the residuals compare between the noisy data and the high resolution data?</a:t>
             </a:r>
           </a:p>
         </p:txBody>
@@ -3192,12 +3254,17 @@
         </p:blipFill>
         <p:spPr>
           <a:xfrm>
-            <a:off x="800976" y="4628852"/>
+            <a:off x="8800164" y="1839585"/>
             <a:ext cx="2802188" cy="1038225"/>
           </a:xfrm>
           <a:prstGeom prst="rect">
             <a:avLst/>
           </a:prstGeom>
+          <a:ln>
+            <a:solidFill>
+              <a:schemeClr val="tx1"/>
+            </a:solidFill>
+          </a:ln>
         </p:spPr>
       </p:pic>
       <p:cxnSp>
@@ -3208,7 +3275,7 @@
         </p:nvCxnSpPr>
         <p:spPr>
           <a:xfrm>
-            <a:off x="2065072" y="4255581"/>
+            <a:off x="10064260" y="1466314"/>
             <a:ext cx="581217" cy="796884"/>
           </a:xfrm>
           <a:prstGeom prst="straightConnector1">
@@ -3252,12 +3319,17 @@
         </p:blipFill>
         <p:spPr>
           <a:xfrm>
-            <a:off x="6856454" y="4190730"/>
+            <a:off x="8432600" y="3266834"/>
             <a:ext cx="3537316" cy="2383155"/>
           </a:xfrm>
           <a:prstGeom prst="rect">
             <a:avLst/>
           </a:prstGeom>
+          <a:ln>
+            <a:solidFill>
+              <a:schemeClr val="tx1"/>
+            </a:solidFill>
+          </a:ln>
         </p:spPr>
       </p:pic>
       <p:sp>
@@ -3268,7 +3340,7 @@
         </p:nvSpPr>
         <p:spPr>
           <a:xfrm>
-            <a:off x="5050053" y="5914776"/>
+            <a:off x="6336904" y="3536391"/>
             <a:ext cx="1613943" cy="369332"/>
           </a:xfrm>
           <a:prstGeom prst="rect">
@@ -3292,13 +3364,15 @@
       <p:cxnSp>
         <p:nvCxnSpPr>
           <p:cNvPr id="12" name="Straight Arrow Connector 11"/>
-          <p:cNvCxnSpPr/>
+          <p:cNvCxnSpPr>
+            <a:stCxn id="9" idx="3"/>
+          </p:cNvCxnSpPr>
           <p:nvPr/>
         </p:nvCxnSpPr>
         <p:spPr>
-          <a:xfrm flipV="1">
-            <a:off x="6089665" y="4741681"/>
-            <a:ext cx="1108481" cy="1037035"/>
+          <a:xfrm>
+            <a:off x="7950847" y="3721057"/>
+            <a:ext cx="641448" cy="57831"/>
           </a:xfrm>
           <a:prstGeom prst="straightConnector1">
             <a:avLst/>
@@ -3333,7 +3407,7 @@
         </p:nvSpPr>
         <p:spPr>
           <a:xfrm>
-            <a:off x="10875523" y="5594050"/>
+            <a:off x="7063292" y="4019290"/>
             <a:ext cx="891591" cy="369332"/>
           </a:xfrm>
           <a:prstGeom prst="rect">
@@ -3361,9 +3435,9 @@
           <p:nvPr/>
         </p:nvCxnSpPr>
         <p:spPr>
-          <a:xfrm flipH="1" flipV="1">
-            <a:off x="9027268" y="4614214"/>
-            <a:ext cx="1848255" cy="1164502"/>
+          <a:xfrm flipV="1">
+            <a:off x="8114122" y="3721057"/>
+            <a:ext cx="1675948" cy="501683"/>
           </a:xfrm>
           <a:prstGeom prst="straightConnector1">
             <a:avLst/>
@@ -3400,7 +3474,7 @@
         </p:nvSpPr>
         <p:spPr>
           <a:xfrm>
-            <a:off x="169137" y="3822112"/>
+            <a:off x="7063292" y="1191903"/>
             <a:ext cx="2401633" cy="426864"/>
           </a:xfrm>
           <a:prstGeom prst="rect">
@@ -3409,7 +3483,7 @@
         </p:spPr>
         <p:txBody>
           <a:bodyPr vert="horz" lIns="91440" tIns="45720" rIns="91440" bIns="45720" rtlCol="0">
-            <a:normAutofit fontScale="92500" lnSpcReduction="10000"/>
+            <a:noAutofit/>
           </a:bodyPr>
           <a:lstStyle>
             <a:lvl1pPr marL="228600" indent="-228600" algn="l" defTabSz="914400" rtl="0" eaLnBrk="1" latinLnBrk="0" hangingPunct="1">
@@ -3581,12 +3655,150 @@
               <a:buNone/>
             </a:pPr>
             <a:r>
-              <a:rPr lang="en-US" dirty="0"/>
+              <a:rPr lang="en-US" u="sng" dirty="0"/>
               <a:t>Using the GUI</a:t>
             </a:r>
           </a:p>
         </p:txBody>
       </p:sp>
+      <p:sp>
+        <p:nvSpPr>
+          <p:cNvPr id="17" name="TextBox 16"/>
+          <p:cNvSpPr txBox="1"/>
+          <p:nvPr/>
+        </p:nvSpPr>
+        <p:spPr>
+          <a:xfrm>
+            <a:off x="7443693" y="5852187"/>
+            <a:ext cx="1984710" cy="369332"/>
+          </a:xfrm>
+          <a:prstGeom prst="rect">
+            <a:avLst/>
+          </a:prstGeom>
+          <a:noFill/>
+        </p:spPr>
+        <p:txBody>
+          <a:bodyPr wrap="none" rtlCol="0">
+            <a:spAutoFit/>
+          </a:bodyPr>
+          <a:lstStyle/>
+          <a:p>
+            <a:r>
+              <a:rPr lang="en-US" dirty="0"/>
+              <a:t>Plot of Data and Fit</a:t>
+            </a:r>
+          </a:p>
+        </p:txBody>
+      </p:sp>
+      <p:sp>
+        <p:nvSpPr>
+          <p:cNvPr id="19" name="TextBox 18"/>
+          <p:cNvSpPr txBox="1"/>
+          <p:nvPr/>
+        </p:nvSpPr>
+        <p:spPr>
+          <a:xfrm>
+            <a:off x="6394862" y="4727985"/>
+            <a:ext cx="1590756" cy="646331"/>
+          </a:xfrm>
+          <a:prstGeom prst="rect">
+            <a:avLst/>
+          </a:prstGeom>
+          <a:noFill/>
+        </p:spPr>
+        <p:txBody>
+          <a:bodyPr wrap="none" rtlCol="0">
+            <a:spAutoFit/>
+          </a:bodyPr>
+          <a:lstStyle/>
+          <a:p>
+            <a:r>
+              <a:rPr lang="en-US" dirty="0"/>
+              <a:t>Fit Parameters </a:t>
+            </a:r>
+          </a:p>
+          <a:p>
+            <a:r>
+              <a:rPr lang="en-US" dirty="0"/>
+              <a:t>and Residuals</a:t>
+            </a:r>
+          </a:p>
+        </p:txBody>
+      </p:sp>
+      <p:cxnSp>
+        <p:nvCxnSpPr>
+          <p:cNvPr id="20" name="Straight Arrow Connector 19"/>
+          <p:cNvCxnSpPr>
+            <a:stCxn id="17" idx="3"/>
+          </p:cNvCxnSpPr>
+          <p:nvPr/>
+        </p:nvCxnSpPr>
+        <p:spPr>
+          <a:xfrm flipV="1">
+            <a:off x="9428403" y="5051151"/>
+            <a:ext cx="772855" cy="985702"/>
+          </a:xfrm>
+          <a:prstGeom prst="straightConnector1">
+            <a:avLst/>
+          </a:prstGeom>
+          <a:ln w="38100">
+            <a:solidFill>
+              <a:schemeClr val="tx1"/>
+            </a:solidFill>
+            <a:tailEnd type="triangle"/>
+          </a:ln>
+        </p:spPr>
+        <p:style>
+          <a:lnRef idx="1">
+            <a:schemeClr val="accent1"/>
+          </a:lnRef>
+          <a:fillRef idx="0">
+            <a:schemeClr val="accent1"/>
+          </a:fillRef>
+          <a:effectRef idx="0">
+            <a:schemeClr val="accent1"/>
+          </a:effectRef>
+          <a:fontRef idx="minor">
+            <a:schemeClr val="tx1"/>
+          </a:fontRef>
+        </p:style>
+      </p:cxnSp>
+      <p:cxnSp>
+        <p:nvCxnSpPr>
+          <p:cNvPr id="24" name="Straight Arrow Connector 23"/>
+          <p:cNvCxnSpPr/>
+          <p:nvPr/>
+        </p:nvCxnSpPr>
+        <p:spPr>
+          <a:xfrm flipV="1">
+            <a:off x="7950847" y="4713212"/>
+            <a:ext cx="716949" cy="345893"/>
+          </a:xfrm>
+          <a:prstGeom prst="straightConnector1">
+            <a:avLst/>
+          </a:prstGeom>
+          <a:ln w="38100">
+            <a:solidFill>
+              <a:schemeClr val="tx1"/>
+            </a:solidFill>
+            <a:tailEnd type="triangle"/>
+          </a:ln>
+        </p:spPr>
+        <p:style>
+          <a:lnRef idx="1">
+            <a:schemeClr val="accent1"/>
+          </a:lnRef>
+          <a:fillRef idx="0">
+            <a:schemeClr val="accent1"/>
+          </a:fillRef>
+          <a:effectRef idx="0">
+            <a:schemeClr val="accent1"/>
+          </a:effectRef>
+          <a:fontRef idx="minor">
+            <a:schemeClr val="tx1"/>
+          </a:fontRef>
+        </p:style>
+      </p:cxnSp>
     </p:spTree>
     <p:extLst>
       <p:ext uri="{BB962C8B-B14F-4D97-AF65-F5344CB8AC3E}">
@@ -3627,6 +3839,217 @@
             <p:ph type="title"/>
           </p:nvPr>
         </p:nvSpPr>
+        <p:spPr>
+          <a:xfrm>
+            <a:off x="262646" y="350195"/>
+            <a:ext cx="10515600" cy="1325563"/>
+          </a:xfrm>
+        </p:spPr>
+        <p:txBody>
+          <a:bodyPr/>
+          <a:lstStyle/>
+          <a:p>
+            <a:r>
+              <a:rPr lang="en-US" dirty="0"/>
+              <a:t>This is what mine looks like</a:t>
+            </a:r>
+            <a:br>
+              <a:rPr lang="en-US" dirty="0"/>
+            </a:br>
+            <a:r>
+              <a:rPr lang="en-US" sz="2800" dirty="0"/>
+              <a:t>extracting coefficients from fits to test data</a:t>
+            </a:r>
+            <a:endParaRPr lang="en-US" dirty="0"/>
+          </a:p>
+        </p:txBody>
+      </p:sp>
+      <p:pic>
+        <p:nvPicPr>
+          <p:cNvPr id="3" name="Picture 2"/>
+          <p:cNvPicPr>
+            <a:picLocks noChangeAspect="1"/>
+          </p:cNvPicPr>
+          <p:nvPr/>
+        </p:nvPicPr>
+        <p:blipFill>
+          <a:blip r:embed="rId2"/>
+          <a:stretch>
+            <a:fillRect/>
+          </a:stretch>
+        </p:blipFill>
+        <p:spPr>
+          <a:xfrm>
+            <a:off x="8165886" y="1570757"/>
+            <a:ext cx="3643493" cy="4363116"/>
+          </a:xfrm>
+          <a:prstGeom prst="rect">
+            <a:avLst/>
+          </a:prstGeom>
+          <a:ln>
+            <a:solidFill>
+              <a:schemeClr val="tx1"/>
+            </a:solidFill>
+          </a:ln>
+        </p:spPr>
+      </p:pic>
+      <p:pic>
+        <p:nvPicPr>
+          <p:cNvPr id="5" name="Picture 4"/>
+          <p:cNvPicPr>
+            <a:picLocks noChangeAspect="1"/>
+          </p:cNvPicPr>
+          <p:nvPr/>
+        </p:nvPicPr>
+        <p:blipFill>
+          <a:blip r:embed="rId3"/>
+          <a:stretch>
+            <a:fillRect/>
+          </a:stretch>
+        </p:blipFill>
+        <p:spPr>
+          <a:xfrm>
+            <a:off x="408562" y="2748298"/>
+            <a:ext cx="7402749" cy="2008033"/>
+          </a:xfrm>
+          <a:prstGeom prst="rect">
+            <a:avLst/>
+          </a:prstGeom>
+          <a:ln>
+            <a:solidFill>
+              <a:schemeClr val="tx1"/>
+            </a:solidFill>
+          </a:ln>
+        </p:spPr>
+      </p:pic>
+    </p:spTree>
+    <p:extLst>
+      <p:ext uri="{BB962C8B-B14F-4D97-AF65-F5344CB8AC3E}">
+        <p14:creationId xmlns:p14="http://schemas.microsoft.com/office/powerpoint/2010/main" val="2746466283"/>
+      </p:ext>
+    </p:extLst>
+  </p:cSld>
+  <p:clrMapOvr>
+    <a:masterClrMapping/>
+  </p:clrMapOvr>
+</p:sld>
+</file>
+
+<file path=ppt/slides/slide12.xml><?xml version="1.0" encoding="utf-8"?>
+<p:sld xmlns:a="http://schemas.openxmlformats.org/drawingml/2006/main" xmlns:r="http://schemas.openxmlformats.org/officeDocument/2006/relationships" xmlns:p="http://schemas.openxmlformats.org/presentationml/2006/main">
+  <p:cSld>
+    <p:spTree>
+      <p:nvGrpSpPr>
+        <p:cNvPr id="1" name=""/>
+        <p:cNvGrpSpPr/>
+        <p:nvPr/>
+      </p:nvGrpSpPr>
+      <p:grpSpPr>
+        <a:xfrm>
+          <a:off x="0" y="0"/>
+          <a:ext cx="0" cy="0"/>
+          <a:chOff x="0" y="0"/>
+          <a:chExt cx="0" cy="0"/>
+        </a:xfrm>
+      </p:grpSpPr>
+      <p:sp>
+        <p:nvSpPr>
+          <p:cNvPr id="2" name="Title 1"/>
+          <p:cNvSpPr>
+            <a:spLocks noGrp="1"/>
+          </p:cNvSpPr>
+          <p:nvPr>
+            <p:ph type="title"/>
+          </p:nvPr>
+        </p:nvSpPr>
+        <p:spPr/>
+        <p:txBody>
+          <a:bodyPr/>
+          <a:lstStyle/>
+          <a:p>
+            <a:r>
+              <a:rPr lang="en-US" dirty="0"/>
+              <a:t>Figuring out test functions</a:t>
+            </a:r>
+          </a:p>
+        </p:txBody>
+      </p:sp>
+      <p:sp>
+        <p:nvSpPr>
+          <p:cNvPr id="3" name="Content Placeholder 2"/>
+          <p:cNvSpPr>
+            <a:spLocks noGrp="1"/>
+          </p:cNvSpPr>
+          <p:nvPr>
+            <p:ph idx="1"/>
+          </p:nvPr>
+        </p:nvSpPr>
+        <p:spPr/>
+        <p:txBody>
+          <a:bodyPr/>
+          <a:lstStyle/>
+          <a:p>
+            <a:r>
+              <a:rPr lang="en-US" dirty="0"/>
+              <a:t>Can you figure out what the </a:t>
+            </a:r>
+            <a:r>
+              <a:rPr lang="en-US" dirty="0" err="1"/>
+              <a:t>coeficients</a:t>
+            </a:r>
+            <a:r>
+              <a:rPr lang="en-US" dirty="0"/>
+              <a:t> on each of the following functions are?</a:t>
+            </a:r>
+          </a:p>
+          <a:p>
+            <a:r>
+              <a:rPr lang="en-US" dirty="0"/>
+              <a:t>Have like 10 or 15 functions without noise on them</a:t>
+            </a:r>
+          </a:p>
+        </p:txBody>
+      </p:sp>
+    </p:spTree>
+    <p:extLst>
+      <p:ext uri="{BB962C8B-B14F-4D97-AF65-F5344CB8AC3E}">
+        <p14:creationId xmlns:p14="http://schemas.microsoft.com/office/powerpoint/2010/main" val="3059122395"/>
+      </p:ext>
+    </p:extLst>
+  </p:cSld>
+  <p:clrMapOvr>
+    <a:masterClrMapping/>
+  </p:clrMapOvr>
+</p:sld>
+</file>
+
+<file path=ppt/slides/slide13.xml><?xml version="1.0" encoding="utf-8"?>
+<p:sld xmlns:a="http://schemas.openxmlformats.org/drawingml/2006/main" xmlns:r="http://schemas.openxmlformats.org/officeDocument/2006/relationships" xmlns:p="http://schemas.openxmlformats.org/presentationml/2006/main">
+  <p:cSld>
+    <p:spTree>
+      <p:nvGrpSpPr>
+        <p:cNvPr id="1" name=""/>
+        <p:cNvGrpSpPr/>
+        <p:nvPr/>
+      </p:nvGrpSpPr>
+      <p:grpSpPr>
+        <a:xfrm>
+          <a:off x="0" y="0"/>
+          <a:ext cx="0" cy="0"/>
+          <a:chOff x="0" y="0"/>
+          <a:chExt cx="0" cy="0"/>
+        </a:xfrm>
+      </p:grpSpPr>
+      <p:sp>
+        <p:nvSpPr>
+          <p:cNvPr id="2" name="Title 1"/>
+          <p:cNvSpPr>
+            <a:spLocks noGrp="1"/>
+          </p:cNvSpPr>
+          <p:nvPr>
+            <p:ph type="title"/>
+          </p:nvPr>
+        </p:nvSpPr>
         <p:spPr/>
         <p:txBody>
           <a:bodyPr/>
@@ -3737,7 +4160,7 @@
 </p:sld>
 </file>
 
-<file path=ppt/slides/slide12.xml><?xml version="1.0" encoding="utf-8"?>
+<file path=ppt/slides/slide14.xml><?xml version="1.0" encoding="utf-8"?>
 <p:sld xmlns:a="http://schemas.openxmlformats.org/drawingml/2006/main" xmlns:r="http://schemas.openxmlformats.org/officeDocument/2006/relationships" xmlns:p="http://schemas.openxmlformats.org/presentationml/2006/main">
   <p:cSld>
     <p:spTree>
@@ -4369,11 +4792,7 @@
           <a:p>
             <a:r>
               <a:rPr lang="en-US" b="1" i="1" dirty="0"/>
-              <a:t>Try to write a program that will create some test data for us to fit functions to.  Have 2 sets of data for each function, a low sample rate set with random noise and a high sample rate set to compare the noisy one to. </a:t>
-            </a:r>
-            <a:r>
-              <a:rPr lang="en-US" b="1" i="1" dirty="0"/>
-              <a:t>Then plot both of the data sets for each function on the same graph to check that they </a:t>
+              <a:t>Try to write a program that will create some test data for us to fit functions to.  Have 2 sets of data for each function, a low sample rate set with random noise and a high sample rate set to compare the noisy one to. Then plot both of the data sets for each function on the same graph to check that they </a:t>
             </a:r>
             <a:r>
               <a:rPr lang="en-US" b="1" i="1" dirty="0" err="1"/>
@@ -4793,7 +5212,7 @@
         <p:spPr>
           <a:xfrm>
             <a:off x="507459" y="1553251"/>
-            <a:ext cx="6875835" cy="3096570"/>
+            <a:ext cx="8359704" cy="3096570"/>
           </a:xfrm>
         </p:spPr>
         <p:txBody>
@@ -4865,7 +5284,7 @@
         </p:nvSpPr>
         <p:spPr>
           <a:xfrm>
-            <a:off x="6374844" y="2878814"/>
+            <a:off x="366809" y="4649821"/>
             <a:ext cx="2016899" cy="923330"/>
           </a:xfrm>
           <a:prstGeom prst="rect">
@@ -4911,7 +5330,7 @@
         </p:nvSpPr>
         <p:spPr>
           <a:xfrm>
-            <a:off x="6374844" y="2509482"/>
+            <a:off x="291308" y="4280489"/>
             <a:ext cx="1512594" cy="369332"/>
           </a:xfrm>
           <a:prstGeom prst="rect">
@@ -4948,7 +5367,7 @@
         </p:blipFill>
         <p:spPr>
           <a:xfrm>
-            <a:off x="9007813" y="1037286"/>
+            <a:off x="9007813" y="682048"/>
             <a:ext cx="2676728" cy="3205406"/>
           </a:xfrm>
           <a:prstGeom prst="rect">
@@ -4969,8 +5388,8 @@
         </p:nvSpPr>
         <p:spPr>
           <a:xfrm>
-            <a:off x="740925" y="5077838"/>
-            <a:ext cx="6096000" cy="646331"/>
+            <a:off x="2647760" y="4649821"/>
+            <a:ext cx="6096000" cy="923330"/>
           </a:xfrm>
           <a:prstGeom prst="rect">
             <a:avLst/>
@@ -4984,7 +5403,7 @@
           <a:p>
             <a:r>
               <a:rPr lang="en-US" b="1" i="1" dirty="0"/>
-              <a:t>Try to replicate the graphs on the right using the test data you generated earlier today and the subplot command.  </a:t>
+              <a:t>Try to replicate the figures on the right using the test data you generated earlier today and the subplot command.  Don’t forget to add axis labels and titles for each of the graphs. </a:t>
             </a:r>
           </a:p>
         </p:txBody>
@@ -5005,7 +5424,7 @@
         </p:blipFill>
         <p:spPr>
           <a:xfrm>
-            <a:off x="9007813" y="4649821"/>
+            <a:off x="9007813" y="4215643"/>
             <a:ext cx="2676728" cy="2007546"/>
           </a:xfrm>
           <a:prstGeom prst="rect">

</xml_diff>